<commit_message>
more worked out game section
</commit_message>
<xml_diff>
--- a/Design docs/Sprint Review #1.pptx
+++ b/Design docs/Sprint Review #1.pptx
@@ -5,22 +5,27 @@
     <p:sldMasterId id="2147483678" r:id="rId1"/>
   </p:sldMasterIdLst>
   <p:notesMasterIdLst>
-    <p:notesMasterId r:id="rId15"/>
+    <p:notesMasterId r:id="rId20"/>
   </p:notesMasterIdLst>
   <p:sldIdLst>
     <p:sldId id="256" r:id="rId2"/>
     <p:sldId id="258" r:id="rId3"/>
     <p:sldId id="257" r:id="rId4"/>
     <p:sldId id="260" r:id="rId5"/>
-    <p:sldId id="261" r:id="rId6"/>
-    <p:sldId id="266" r:id="rId7"/>
-    <p:sldId id="265" r:id="rId8"/>
-    <p:sldId id="262" r:id="rId9"/>
-    <p:sldId id="263" r:id="rId10"/>
-    <p:sldId id="264" r:id="rId11"/>
-    <p:sldId id="267" r:id="rId12"/>
-    <p:sldId id="268" r:id="rId13"/>
-    <p:sldId id="269" r:id="rId14"/>
+    <p:sldId id="270" r:id="rId6"/>
+    <p:sldId id="271" r:id="rId7"/>
+    <p:sldId id="272" r:id="rId8"/>
+    <p:sldId id="273" r:id="rId9"/>
+    <p:sldId id="261" r:id="rId10"/>
+    <p:sldId id="266" r:id="rId11"/>
+    <p:sldId id="265" r:id="rId12"/>
+    <p:sldId id="262" r:id="rId13"/>
+    <p:sldId id="263" r:id="rId14"/>
+    <p:sldId id="264" r:id="rId15"/>
+    <p:sldId id="267" r:id="rId16"/>
+    <p:sldId id="268" r:id="rId17"/>
+    <p:sldId id="269" r:id="rId18"/>
+    <p:sldId id="274" r:id="rId19"/>
   </p:sldIdLst>
   <p:sldSz cx="12192000" cy="6858000"/>
   <p:notesSz cx="6858000" cy="9144000"/>
@@ -119,6 +124,11 @@
       </a:defRPr>
     </a:lvl9pPr>
   </p:defaultTextStyle>
+  <p:extLst>
+    <p:ext uri="{EFAFB233-063F-42B5-8137-9DF3F51BA10A}">
+      <p15:sldGuideLst xmlns:p15="http://schemas.microsoft.com/office/powerpoint/2012/main"/>
+    </p:ext>
+  </p:extLst>
 </p:presentation>
 </file>
 
@@ -606,7 +616,7 @@
           <a:p>
             <a:r>
               <a:rPr lang="en-US" dirty="0"/>
-              <a:t>Many slides of concept art/our art style</a:t>
+              <a:t>Show how good we are at planning</a:t>
             </a:r>
             <a:endParaRPr lang="en-GB" dirty="0"/>
           </a:p>
@@ -638,7 +648,7 @@
     </p:spTree>
     <p:extLst>
       <p:ext uri="{BB962C8B-B14F-4D97-AF65-F5344CB8AC3E}">
-        <p14:creationId xmlns:p14="http://schemas.microsoft.com/office/powerpoint/2010/main" val="1999500745"/>
+        <p14:creationId xmlns:p14="http://schemas.microsoft.com/office/powerpoint/2010/main" val="3298757979"/>
       </p:ext>
     </p:extLst>
   </p:cSld>
@@ -694,7 +704,7 @@
           <a:p>
             <a:r>
               <a:rPr lang="en-US" dirty="0"/>
-              <a:t>Not the git document that’s earlier it’s the programming that’s the answer</a:t>
+              <a:t>Short bit where I go over the process of making the wireframes</a:t>
             </a:r>
             <a:endParaRPr lang="en-GB" dirty="0"/>
           </a:p>
@@ -726,7 +736,7 @@
     </p:spTree>
     <p:extLst>
       <p:ext uri="{BB962C8B-B14F-4D97-AF65-F5344CB8AC3E}">
-        <p14:creationId xmlns:p14="http://schemas.microsoft.com/office/powerpoint/2010/main" val="2317457653"/>
+        <p14:creationId xmlns:p14="http://schemas.microsoft.com/office/powerpoint/2010/main" val="1897303471"/>
       </p:ext>
     </p:extLst>
   </p:cSld>
@@ -781,8 +791,12 @@
           <a:lstStyle/>
           <a:p>
             <a:r>
+              <a:rPr lang="en-US" dirty="0" err="1"/>
+              <a:t>Moodboard</a:t>
+            </a:r>
+            <a:r>
               <a:rPr lang="en-US" dirty="0"/>
-              <a:t>Boat shoots trash</a:t>
+              <a:t> and possibly iterations?</a:t>
             </a:r>
             <a:endParaRPr lang="en-GB" dirty="0"/>
           </a:p>
@@ -814,7 +828,7 @@
     </p:spTree>
     <p:extLst>
       <p:ext uri="{BB962C8B-B14F-4D97-AF65-F5344CB8AC3E}">
-        <p14:creationId xmlns:p14="http://schemas.microsoft.com/office/powerpoint/2010/main" val="1849390949"/>
+        <p14:creationId xmlns:p14="http://schemas.microsoft.com/office/powerpoint/2010/main" val="1468171116"/>
       </p:ext>
     </p:extLst>
   </p:cSld>
@@ -869,14 +883,14 @@
           <a:lstStyle/>
           <a:p>
             <a:r>
+              <a:rPr lang="en-US" dirty="0" err="1"/>
+              <a:t>Whats</a:t>
+            </a:r>
+            <a:r>
               <a:rPr lang="en-US" dirty="0"/>
-              <a:t>Next week sprint backlog, what are we planning on doing next week</a:t>
-            </a:r>
-            <a:r>
-              <a:rPr lang="en-US"/>
-              <a:t>?(nice quick fire list)</a:t>
-            </a:r>
-            <a:endParaRPr lang="en-GB"/>
+              <a:t> our style</a:t>
+            </a:r>
+            <a:endParaRPr lang="en-GB" dirty="0"/>
           </a:p>
         </p:txBody>
       </p:sp>
@@ -898,6 +912,362 @@
             <a:fld id="{0E8EE311-2E3A-48F1-8488-475CA9E3D5E2}" type="slidenum">
               <a:rPr lang="en-GB" smtClean="0"/>
               <a:t>13</a:t>
+            </a:fld>
+            <a:endParaRPr lang="en-GB"/>
+          </a:p>
+        </p:txBody>
+      </p:sp>
+    </p:spTree>
+    <p:extLst>
+      <p:ext uri="{BB962C8B-B14F-4D97-AF65-F5344CB8AC3E}">
+        <p14:creationId xmlns:p14="http://schemas.microsoft.com/office/powerpoint/2010/main" val="3848644161"/>
+      </p:ext>
+    </p:extLst>
+  </p:cSld>
+  <p:clrMapOvr>
+    <a:masterClrMapping/>
+  </p:clrMapOvr>
+</p:notes>
+</file>
+
+<file path=ppt/notesSlides/notesSlide14.xml><?xml version="1.0" encoding="utf-8"?>
+<p:notes xmlns:a="http://schemas.openxmlformats.org/drawingml/2006/main" xmlns:r="http://schemas.openxmlformats.org/officeDocument/2006/relationships" xmlns:p="http://schemas.openxmlformats.org/presentationml/2006/main">
+  <p:cSld>
+    <p:spTree>
+      <p:nvGrpSpPr>
+        <p:cNvPr id="1" name=""/>
+        <p:cNvGrpSpPr/>
+        <p:nvPr/>
+      </p:nvGrpSpPr>
+      <p:grpSpPr>
+        <a:xfrm>
+          <a:off x="0" y="0"/>
+          <a:ext cx="0" cy="0"/>
+          <a:chOff x="0" y="0"/>
+          <a:chExt cx="0" cy="0"/>
+        </a:xfrm>
+      </p:grpSpPr>
+      <p:sp>
+        <p:nvSpPr>
+          <p:cNvPr id="2" name="Tijdelijke aanduiding voor dia-afbeelding 1"/>
+          <p:cNvSpPr>
+            <a:spLocks noGrp="1" noRot="1" noChangeAspect="1"/>
+          </p:cNvSpPr>
+          <p:nvPr>
+            <p:ph type="sldImg"/>
+          </p:nvPr>
+        </p:nvSpPr>
+        <p:spPr/>
+      </p:sp>
+      <p:sp>
+        <p:nvSpPr>
+          <p:cNvPr id="3" name="Tijdelijke aanduiding voor notities 2"/>
+          <p:cNvSpPr>
+            <a:spLocks noGrp="1"/>
+          </p:cNvSpPr>
+          <p:nvPr>
+            <p:ph type="body" idx="1"/>
+          </p:nvPr>
+        </p:nvSpPr>
+        <p:spPr/>
+        <p:txBody>
+          <a:bodyPr/>
+          <a:lstStyle/>
+          <a:p>
+            <a:r>
+              <a:rPr lang="en-US" dirty="0"/>
+              <a:t>Many slides of concept art/our art style</a:t>
+            </a:r>
+            <a:endParaRPr lang="en-GB" dirty="0"/>
+          </a:p>
+        </p:txBody>
+      </p:sp>
+      <p:sp>
+        <p:nvSpPr>
+          <p:cNvPr id="4" name="Tijdelijke aanduiding voor dianummer 3"/>
+          <p:cNvSpPr>
+            <a:spLocks noGrp="1"/>
+          </p:cNvSpPr>
+          <p:nvPr>
+            <p:ph type="sldNum" sz="quarter" idx="5"/>
+          </p:nvPr>
+        </p:nvSpPr>
+        <p:spPr/>
+        <p:txBody>
+          <a:bodyPr/>
+          <a:lstStyle/>
+          <a:p>
+            <a:fld id="{0E8EE311-2E3A-48F1-8488-475CA9E3D5E2}" type="slidenum">
+              <a:rPr lang="en-GB" smtClean="0"/>
+              <a:t>14</a:t>
+            </a:fld>
+            <a:endParaRPr lang="en-GB"/>
+          </a:p>
+        </p:txBody>
+      </p:sp>
+    </p:spTree>
+    <p:extLst>
+      <p:ext uri="{BB962C8B-B14F-4D97-AF65-F5344CB8AC3E}">
+        <p14:creationId xmlns:p14="http://schemas.microsoft.com/office/powerpoint/2010/main" val="1999500745"/>
+      </p:ext>
+    </p:extLst>
+  </p:cSld>
+  <p:clrMapOvr>
+    <a:masterClrMapping/>
+  </p:clrMapOvr>
+</p:notes>
+</file>
+
+<file path=ppt/notesSlides/notesSlide15.xml><?xml version="1.0" encoding="utf-8"?>
+<p:notes xmlns:a="http://schemas.openxmlformats.org/drawingml/2006/main" xmlns:r="http://schemas.openxmlformats.org/officeDocument/2006/relationships" xmlns:p="http://schemas.openxmlformats.org/presentationml/2006/main">
+  <p:cSld>
+    <p:spTree>
+      <p:nvGrpSpPr>
+        <p:cNvPr id="1" name=""/>
+        <p:cNvGrpSpPr/>
+        <p:nvPr/>
+      </p:nvGrpSpPr>
+      <p:grpSpPr>
+        <a:xfrm>
+          <a:off x="0" y="0"/>
+          <a:ext cx="0" cy="0"/>
+          <a:chOff x="0" y="0"/>
+          <a:chExt cx="0" cy="0"/>
+        </a:xfrm>
+      </p:grpSpPr>
+      <p:sp>
+        <p:nvSpPr>
+          <p:cNvPr id="2" name="Tijdelijke aanduiding voor dia-afbeelding 1"/>
+          <p:cNvSpPr>
+            <a:spLocks noGrp="1" noRot="1" noChangeAspect="1"/>
+          </p:cNvSpPr>
+          <p:nvPr>
+            <p:ph type="sldImg"/>
+          </p:nvPr>
+        </p:nvSpPr>
+        <p:spPr/>
+      </p:sp>
+      <p:sp>
+        <p:nvSpPr>
+          <p:cNvPr id="3" name="Tijdelijke aanduiding voor notities 2"/>
+          <p:cNvSpPr>
+            <a:spLocks noGrp="1"/>
+          </p:cNvSpPr>
+          <p:nvPr>
+            <p:ph type="body" idx="1"/>
+          </p:nvPr>
+        </p:nvSpPr>
+        <p:spPr/>
+        <p:txBody>
+          <a:bodyPr/>
+          <a:lstStyle/>
+          <a:p>
+            <a:r>
+              <a:rPr lang="en-US" dirty="0"/>
+              <a:t>Not the git document that’s earlier it’s the programming that’s the answer</a:t>
+            </a:r>
+            <a:endParaRPr lang="en-GB" dirty="0"/>
+          </a:p>
+        </p:txBody>
+      </p:sp>
+      <p:sp>
+        <p:nvSpPr>
+          <p:cNvPr id="4" name="Tijdelijke aanduiding voor dianummer 3"/>
+          <p:cNvSpPr>
+            <a:spLocks noGrp="1"/>
+          </p:cNvSpPr>
+          <p:nvPr>
+            <p:ph type="sldNum" sz="quarter" idx="5"/>
+          </p:nvPr>
+        </p:nvSpPr>
+        <p:spPr/>
+        <p:txBody>
+          <a:bodyPr/>
+          <a:lstStyle/>
+          <a:p>
+            <a:fld id="{0E8EE311-2E3A-48F1-8488-475CA9E3D5E2}" type="slidenum">
+              <a:rPr lang="en-GB" smtClean="0"/>
+              <a:t>15</a:t>
+            </a:fld>
+            <a:endParaRPr lang="en-GB"/>
+          </a:p>
+        </p:txBody>
+      </p:sp>
+    </p:spTree>
+    <p:extLst>
+      <p:ext uri="{BB962C8B-B14F-4D97-AF65-F5344CB8AC3E}">
+        <p14:creationId xmlns:p14="http://schemas.microsoft.com/office/powerpoint/2010/main" val="2317457653"/>
+      </p:ext>
+    </p:extLst>
+  </p:cSld>
+  <p:clrMapOvr>
+    <a:masterClrMapping/>
+  </p:clrMapOvr>
+</p:notes>
+</file>
+
+<file path=ppt/notesSlides/notesSlide16.xml><?xml version="1.0" encoding="utf-8"?>
+<p:notes xmlns:a="http://schemas.openxmlformats.org/drawingml/2006/main" xmlns:r="http://schemas.openxmlformats.org/officeDocument/2006/relationships" xmlns:p="http://schemas.openxmlformats.org/presentationml/2006/main">
+  <p:cSld>
+    <p:spTree>
+      <p:nvGrpSpPr>
+        <p:cNvPr id="1" name=""/>
+        <p:cNvGrpSpPr/>
+        <p:nvPr/>
+      </p:nvGrpSpPr>
+      <p:grpSpPr>
+        <a:xfrm>
+          <a:off x="0" y="0"/>
+          <a:ext cx="0" cy="0"/>
+          <a:chOff x="0" y="0"/>
+          <a:chExt cx="0" cy="0"/>
+        </a:xfrm>
+      </p:grpSpPr>
+      <p:sp>
+        <p:nvSpPr>
+          <p:cNvPr id="2" name="Tijdelijke aanduiding voor dia-afbeelding 1"/>
+          <p:cNvSpPr>
+            <a:spLocks noGrp="1" noRot="1" noChangeAspect="1"/>
+          </p:cNvSpPr>
+          <p:nvPr>
+            <p:ph type="sldImg"/>
+          </p:nvPr>
+        </p:nvSpPr>
+        <p:spPr/>
+      </p:sp>
+      <p:sp>
+        <p:nvSpPr>
+          <p:cNvPr id="3" name="Tijdelijke aanduiding voor notities 2"/>
+          <p:cNvSpPr>
+            <a:spLocks noGrp="1"/>
+          </p:cNvSpPr>
+          <p:nvPr>
+            <p:ph type="body" idx="1"/>
+          </p:nvPr>
+        </p:nvSpPr>
+        <p:spPr/>
+        <p:txBody>
+          <a:bodyPr/>
+          <a:lstStyle/>
+          <a:p>
+            <a:r>
+              <a:rPr lang="en-US" dirty="0"/>
+              <a:t>Boat shoots trash</a:t>
+            </a:r>
+            <a:endParaRPr lang="en-GB" dirty="0"/>
+          </a:p>
+        </p:txBody>
+      </p:sp>
+      <p:sp>
+        <p:nvSpPr>
+          <p:cNvPr id="4" name="Tijdelijke aanduiding voor dianummer 3"/>
+          <p:cNvSpPr>
+            <a:spLocks noGrp="1"/>
+          </p:cNvSpPr>
+          <p:nvPr>
+            <p:ph type="sldNum" sz="quarter" idx="5"/>
+          </p:nvPr>
+        </p:nvSpPr>
+        <p:spPr/>
+        <p:txBody>
+          <a:bodyPr/>
+          <a:lstStyle/>
+          <a:p>
+            <a:fld id="{0E8EE311-2E3A-48F1-8488-475CA9E3D5E2}" type="slidenum">
+              <a:rPr lang="en-GB" smtClean="0"/>
+              <a:t>16</a:t>
+            </a:fld>
+            <a:endParaRPr lang="en-GB"/>
+          </a:p>
+        </p:txBody>
+      </p:sp>
+    </p:spTree>
+    <p:extLst>
+      <p:ext uri="{BB962C8B-B14F-4D97-AF65-F5344CB8AC3E}">
+        <p14:creationId xmlns:p14="http://schemas.microsoft.com/office/powerpoint/2010/main" val="1849390949"/>
+      </p:ext>
+    </p:extLst>
+  </p:cSld>
+  <p:clrMapOvr>
+    <a:masterClrMapping/>
+  </p:clrMapOvr>
+</p:notes>
+</file>
+
+<file path=ppt/notesSlides/notesSlide17.xml><?xml version="1.0" encoding="utf-8"?>
+<p:notes xmlns:a="http://schemas.openxmlformats.org/drawingml/2006/main" xmlns:r="http://schemas.openxmlformats.org/officeDocument/2006/relationships" xmlns:p="http://schemas.openxmlformats.org/presentationml/2006/main">
+  <p:cSld>
+    <p:spTree>
+      <p:nvGrpSpPr>
+        <p:cNvPr id="1" name=""/>
+        <p:cNvGrpSpPr/>
+        <p:nvPr/>
+      </p:nvGrpSpPr>
+      <p:grpSpPr>
+        <a:xfrm>
+          <a:off x="0" y="0"/>
+          <a:ext cx="0" cy="0"/>
+          <a:chOff x="0" y="0"/>
+          <a:chExt cx="0" cy="0"/>
+        </a:xfrm>
+      </p:grpSpPr>
+      <p:sp>
+        <p:nvSpPr>
+          <p:cNvPr id="2" name="Tijdelijke aanduiding voor dia-afbeelding 1"/>
+          <p:cNvSpPr>
+            <a:spLocks noGrp="1" noRot="1" noChangeAspect="1"/>
+          </p:cNvSpPr>
+          <p:nvPr>
+            <p:ph type="sldImg"/>
+          </p:nvPr>
+        </p:nvSpPr>
+        <p:spPr/>
+      </p:sp>
+      <p:sp>
+        <p:nvSpPr>
+          <p:cNvPr id="3" name="Tijdelijke aanduiding voor notities 2"/>
+          <p:cNvSpPr>
+            <a:spLocks noGrp="1"/>
+          </p:cNvSpPr>
+          <p:nvPr>
+            <p:ph type="body" idx="1"/>
+          </p:nvPr>
+        </p:nvSpPr>
+        <p:spPr/>
+        <p:txBody>
+          <a:bodyPr/>
+          <a:lstStyle/>
+          <a:p>
+            <a:r>
+              <a:rPr lang="en-US" dirty="0"/>
+              <a:t>Next week sprint backlog, what are we planning on doing next week</a:t>
+            </a:r>
+            <a:r>
+              <a:rPr lang="en-US"/>
+              <a:t>?(nice quick fire list)</a:t>
+            </a:r>
+            <a:endParaRPr lang="en-GB"/>
+          </a:p>
+        </p:txBody>
+      </p:sp>
+      <p:sp>
+        <p:nvSpPr>
+          <p:cNvPr id="4" name="Tijdelijke aanduiding voor dianummer 3"/>
+          <p:cNvSpPr>
+            <a:spLocks noGrp="1"/>
+          </p:cNvSpPr>
+          <p:nvPr>
+            <p:ph type="sldNum" sz="quarter" idx="5"/>
+          </p:nvPr>
+        </p:nvSpPr>
+        <p:spPr/>
+        <p:txBody>
+          <a:bodyPr/>
+          <a:lstStyle/>
+          <a:p>
+            <a:fld id="{0E8EE311-2E3A-48F1-8488-475CA9E3D5E2}" type="slidenum">
+              <a:rPr lang="en-GB" smtClean="0"/>
+              <a:t>17</a:t>
             </a:fld>
             <a:endParaRPr lang="en-GB"/>
           </a:p>
@@ -1050,7 +1420,15 @@
           <a:p>
             <a:r>
               <a:rPr lang="en-US" dirty="0"/>
-              <a:t>This is where we briefly go over what the organization is</a:t>
+              <a:t>Ocean cleanup is a Rotterdam based organization dedicated to cleaning up the great garbage patches, currently deploying in the biggest and most researched one: the north </a:t>
+            </a:r>
+            <a:r>
+              <a:rPr lang="en-US" dirty="0" err="1"/>
+              <a:t>atlantic</a:t>
+            </a:r>
+            <a:r>
+              <a:rPr lang="en-US" dirty="0"/>
+              <a:t> patch</a:t>
             </a:r>
             <a:endParaRPr lang="en-GB" dirty="0"/>
           </a:p>
@@ -1138,7 +1516,7 @@
           <a:p>
             <a:r>
               <a:rPr lang="en-US" dirty="0"/>
-              <a:t>This is where I show the research we did into what to make and how we arrived at the conclusion of making a mobile game</a:t>
+              <a:t>Ocean cleanup/message of hope/informing new audiences is important</a:t>
             </a:r>
             <a:endParaRPr lang="en-GB" dirty="0"/>
           </a:p>
@@ -1226,7 +1604,7 @@
           <a:p>
             <a:r>
               <a:rPr lang="en-US" dirty="0"/>
-              <a:t>This is where I go over what the game actually is</a:t>
+              <a:t>Biggest audience in the world for a unity3d product is mobile games</a:t>
             </a:r>
             <a:endParaRPr lang="en-GB" dirty="0"/>
           </a:p>
@@ -1258,7 +1636,7 @@
     </p:spTree>
     <p:extLst>
       <p:ext uri="{BB962C8B-B14F-4D97-AF65-F5344CB8AC3E}">
-        <p14:creationId xmlns:p14="http://schemas.microsoft.com/office/powerpoint/2010/main" val="3458936031"/>
+        <p14:creationId xmlns:p14="http://schemas.microsoft.com/office/powerpoint/2010/main" val="886452888"/>
       </p:ext>
     </p:extLst>
   </p:cSld>
@@ -1314,7 +1692,7 @@
           <a:p>
             <a:r>
               <a:rPr lang="en-US" dirty="0"/>
-              <a:t>Show how good we are at planning</a:t>
+              <a:t>5 types in total</a:t>
             </a:r>
             <a:endParaRPr lang="en-GB" dirty="0"/>
           </a:p>
@@ -1346,7 +1724,7 @@
     </p:spTree>
     <p:extLst>
       <p:ext uri="{BB962C8B-B14F-4D97-AF65-F5344CB8AC3E}">
-        <p14:creationId xmlns:p14="http://schemas.microsoft.com/office/powerpoint/2010/main" val="3298757979"/>
+        <p14:creationId xmlns:p14="http://schemas.microsoft.com/office/powerpoint/2010/main" val="1888550803"/>
       </p:ext>
     </p:extLst>
   </p:cSld>
@@ -1402,7 +1780,7 @@
           <a:p>
             <a:r>
               <a:rPr lang="en-US" dirty="0"/>
-              <a:t>Short bit where I go over the process of making the wireframes</a:t>
+              <a:t>High passion so most likely to try our game = connected enthusiasts &amp; playful explorers</a:t>
             </a:r>
             <a:endParaRPr lang="en-GB" dirty="0"/>
           </a:p>
@@ -1434,7 +1812,7 @@
     </p:spTree>
     <p:extLst>
       <p:ext uri="{BB962C8B-B14F-4D97-AF65-F5344CB8AC3E}">
-        <p14:creationId xmlns:p14="http://schemas.microsoft.com/office/powerpoint/2010/main" val="1897303471"/>
+        <p14:creationId xmlns:p14="http://schemas.microsoft.com/office/powerpoint/2010/main" val="3816697769"/>
       </p:ext>
     </p:extLst>
   </p:cSld>
@@ -1489,12 +1867,8 @@
           <a:lstStyle/>
           <a:p>
             <a:r>
-              <a:rPr lang="en-US" dirty="0" err="1"/>
-              <a:t>Moodboard</a:t>
-            </a:r>
-            <a:r>
               <a:rPr lang="en-US" dirty="0"/>
-              <a:t> and possibly iterations?</a:t>
+              <a:t>Aka we had 3 choices of game type, now puzzle was the biggest by far but we decided to brainstorm a few game ideas that we liked and thought were fun and action seemed like the most fun</a:t>
             </a:r>
             <a:endParaRPr lang="en-GB" dirty="0"/>
           </a:p>
@@ -1526,7 +1900,7 @@
     </p:spTree>
     <p:extLst>
       <p:ext uri="{BB962C8B-B14F-4D97-AF65-F5344CB8AC3E}">
-        <p14:creationId xmlns:p14="http://schemas.microsoft.com/office/powerpoint/2010/main" val="1468171116"/>
+        <p14:creationId xmlns:p14="http://schemas.microsoft.com/office/powerpoint/2010/main" val="2341484968"/>
       </p:ext>
     </p:extLst>
   </p:cSld>
@@ -1581,12 +1955,8 @@
           <a:lstStyle/>
           <a:p>
             <a:r>
-              <a:rPr lang="en-US" dirty="0" err="1"/>
-              <a:t>Whats</a:t>
-            </a:r>
-            <a:r>
               <a:rPr lang="en-US" dirty="0"/>
-              <a:t> our style</a:t>
+              <a:t>You just lost it</a:t>
             </a:r>
             <a:endParaRPr lang="en-GB" dirty="0"/>
           </a:p>
@@ -1618,7 +1988,7 @@
     </p:spTree>
     <p:extLst>
       <p:ext uri="{BB962C8B-B14F-4D97-AF65-F5344CB8AC3E}">
-        <p14:creationId xmlns:p14="http://schemas.microsoft.com/office/powerpoint/2010/main" val="3848644161"/>
+        <p14:creationId xmlns:p14="http://schemas.microsoft.com/office/powerpoint/2010/main" val="3458936031"/>
       </p:ext>
     </p:extLst>
   </p:cSld>
@@ -4894,6 +5264,8 @@
                 <a:solidFill>
                   <a:schemeClr val="bg1"/>
                 </a:solidFill>
+                <a:latin typeface="Carter one" panose="03080802040405060005" pitchFamily="66" charset="0"/>
+                <a:ea typeface="Carter one" panose="03080802040405060005" pitchFamily="66" charset="0"/>
               </a:rPr>
               <a:t>We are #1</a:t>
             </a:r>
@@ -4901,6 +5273,8 @@
               <a:solidFill>
                 <a:schemeClr val="bg1"/>
               </a:solidFill>
+              <a:latin typeface="Carter one" panose="03080802040405060005" pitchFamily="66" charset="0"/>
+              <a:ea typeface="Carter one" panose="03080802040405060005" pitchFamily="66" charset="0"/>
             </a:endParaRPr>
           </a:p>
         </p:txBody>
@@ -4931,6 +5305,7 @@
                 <a:solidFill>
                   <a:schemeClr val="bg1"/>
                 </a:solidFill>
+                <a:latin typeface="Tenor sans" panose="02000000000000000000" pitchFamily="2" charset="0"/>
               </a:rPr>
               <a:t>Sprint Review Project Hope</a:t>
             </a:r>
@@ -4938,6 +5313,7 @@
               <a:solidFill>
                 <a:schemeClr val="bg1"/>
               </a:solidFill>
+              <a:latin typeface="Tenor sans" panose="02000000000000000000" pitchFamily="2" charset="0"/>
             </a:endParaRPr>
           </a:p>
         </p:txBody>
@@ -4977,7 +5353,7 @@
           <p:cNvPr id="2" name="Titel 1">
             <a:extLst>
               <a:ext uri="{FF2B5EF4-FFF2-40B4-BE49-F238E27FC236}">
-                <a16:creationId xmlns:a16="http://schemas.microsoft.com/office/drawing/2014/main" id="{81A46E86-88FF-49A3-A35E-5DBB04ADCBDE}"/>
+                <a16:creationId xmlns:a16="http://schemas.microsoft.com/office/drawing/2014/main" id="{2C3FD24F-DA43-429F-87BD-C94824342686}"/>
               </a:ext>
             </a:extLst>
           </p:cNvPr>
@@ -4990,14 +5366,32 @@
         </p:nvSpPr>
         <p:spPr/>
         <p:txBody>
-          <a:bodyPr/>
-          <a:lstStyle/>
-          <a:p>
-            <a:r>
-              <a:rPr lang="en-US" dirty="0"/>
-              <a:t>Concept Art Section</a:t>
-            </a:r>
-            <a:endParaRPr lang="en-GB" dirty="0"/>
+          <a:bodyPr>
+            <a:normAutofit fontScale="90000"/>
+          </a:bodyPr>
+          <a:lstStyle/>
+          <a:p>
+            <a:r>
+              <a:rPr lang="en-US" dirty="0">
+                <a:latin typeface="Tenor sans" panose="02000000000000000000" pitchFamily="2" charset="0"/>
+              </a:rPr>
+              <a:t>Mention about all the planning documents we have?(GDD/Asset lists/</a:t>
+            </a:r>
+            <a:r>
+              <a:rPr lang="en-US" dirty="0" err="1">
+                <a:latin typeface="Tenor sans" panose="02000000000000000000" pitchFamily="2" charset="0"/>
+              </a:rPr>
+              <a:t>trello</a:t>
+            </a:r>
+            <a:r>
+              <a:rPr lang="en-US" dirty="0">
+                <a:latin typeface="Tenor sans" panose="02000000000000000000" pitchFamily="2" charset="0"/>
+              </a:rPr>
+              <a:t>/git)</a:t>
+            </a:r>
+            <a:endParaRPr lang="en-GB" dirty="0">
+              <a:latin typeface="Tenor sans" panose="02000000000000000000" pitchFamily="2" charset="0"/>
+            </a:endParaRPr>
           </a:p>
         </p:txBody>
       </p:sp>
@@ -5006,7 +5400,7 @@
           <p:cNvPr id="3" name="Tijdelijke aanduiding voor inhoud 2">
             <a:extLst>
               <a:ext uri="{FF2B5EF4-FFF2-40B4-BE49-F238E27FC236}">
-                <a16:creationId xmlns:a16="http://schemas.microsoft.com/office/drawing/2014/main" id="{B6168058-30A4-4F3D-998A-8E91A73047A4}"/>
+                <a16:creationId xmlns:a16="http://schemas.microsoft.com/office/drawing/2014/main" id="{71B985FD-54EB-415E-A191-02AB371F2FCD}"/>
               </a:ext>
             </a:extLst>
           </p:cNvPr>
@@ -5022,14 +5416,102 @@
           <a:bodyPr/>
           <a:lstStyle/>
           <a:p>
-            <a:endParaRPr lang="en-GB"/>
+            <a:r>
+              <a:rPr lang="en-US" dirty="0">
+                <a:latin typeface="Tenor sans" panose="02000000000000000000" pitchFamily="2" charset="0"/>
+              </a:rPr>
+              <a:t>Make sure to explain </a:t>
+            </a:r>
+            <a:r>
+              <a:rPr lang="en-US" dirty="0" err="1">
+                <a:latin typeface="Tenor sans" panose="02000000000000000000" pitchFamily="2" charset="0"/>
+              </a:rPr>
+              <a:t>theyre</a:t>
+            </a:r>
+            <a:r>
+              <a:rPr lang="en-US" dirty="0">
+                <a:latin typeface="Tenor sans" panose="02000000000000000000" pitchFamily="2" charset="0"/>
+              </a:rPr>
+              <a:t> living breathing documents that will keep getting edited during the project they’d eat that shit up </a:t>
+            </a:r>
+            <a:r>
+              <a:rPr lang="en-US" dirty="0" err="1">
+                <a:latin typeface="Tenor sans" panose="02000000000000000000" pitchFamily="2" charset="0"/>
+              </a:rPr>
+              <a:t>ya</a:t>
+            </a:r>
+            <a:r>
+              <a:rPr lang="en-US" dirty="0">
+                <a:latin typeface="Tenor sans" panose="02000000000000000000" pitchFamily="2" charset="0"/>
+              </a:rPr>
+              <a:t> dig</a:t>
+            </a:r>
+          </a:p>
+          <a:p>
+            <a:r>
+              <a:rPr lang="en-US" dirty="0">
+                <a:latin typeface="Tenor sans" panose="02000000000000000000" pitchFamily="2" charset="0"/>
+              </a:rPr>
+              <a:t>Also a natural place to mention </a:t>
+            </a:r>
+            <a:r>
+              <a:rPr lang="en-US" dirty="0" err="1">
+                <a:latin typeface="Tenor sans" panose="02000000000000000000" pitchFamily="2" charset="0"/>
+              </a:rPr>
+              <a:t>trello</a:t>
+            </a:r>
+            <a:r>
+              <a:rPr lang="en-US" dirty="0">
+                <a:latin typeface="Tenor sans" panose="02000000000000000000" pitchFamily="2" charset="0"/>
+              </a:rPr>
+              <a:t>/</a:t>
+            </a:r>
+            <a:r>
+              <a:rPr lang="en-US" dirty="0" err="1">
+                <a:latin typeface="Tenor sans" panose="02000000000000000000" pitchFamily="2" charset="0"/>
+              </a:rPr>
+              <a:t>github</a:t>
+            </a:r>
+            <a:r>
+              <a:rPr lang="en-US" dirty="0">
+                <a:latin typeface="Tenor sans" panose="02000000000000000000" pitchFamily="2" charset="0"/>
+              </a:rPr>
+              <a:t>/</a:t>
+            </a:r>
+            <a:r>
+              <a:rPr lang="en-US" dirty="0" err="1">
+                <a:latin typeface="Tenor sans" panose="02000000000000000000" pitchFamily="2" charset="0"/>
+              </a:rPr>
+              <a:t>sourcetree</a:t>
+            </a:r>
+            <a:r>
+              <a:rPr lang="en-US" dirty="0">
+                <a:latin typeface="Tenor sans" panose="02000000000000000000" pitchFamily="2" charset="0"/>
+              </a:rPr>
+              <a:t>/discord/</a:t>
+            </a:r>
+            <a:r>
+              <a:rPr lang="en-US" dirty="0" err="1">
+                <a:latin typeface="Tenor sans" panose="02000000000000000000" pitchFamily="2" charset="0"/>
+              </a:rPr>
+              <a:t>whatsapp</a:t>
+            </a:r>
+            <a:r>
+              <a:rPr lang="en-GB" dirty="0">
+                <a:latin typeface="Tenor sans" panose="02000000000000000000" pitchFamily="2" charset="0"/>
+              </a:rPr>
+              <a:t> but at the start after the team section is also OK</a:t>
+            </a:r>
+            <a:endParaRPr lang="en-US" dirty="0">
+              <a:latin typeface="Tenor sans" panose="02000000000000000000" pitchFamily="2" charset="0"/>
+            </a:endParaRPr>
           </a:p>
         </p:txBody>
       </p:sp>
     </p:spTree>
     <p:extLst>
       <p:ext uri="{BB962C8B-B14F-4D97-AF65-F5344CB8AC3E}">
-        <p14:creationId xmlns:p14="http://schemas.microsoft.com/office/powerpoint/2010/main" val="4151834702"/>
+        <p14:creationId xmlns:p14="http://schemas.microsoft.com/office/powerpoint/2010/main" val="3181745625"/>
       </p:ext>
     </p:extLst>
   </p:cSld>
@@ -5061,7 +5543,7 @@
           <p:cNvPr id="2" name="Titel 1">
             <a:extLst>
               <a:ext uri="{FF2B5EF4-FFF2-40B4-BE49-F238E27FC236}">
-                <a16:creationId xmlns:a16="http://schemas.microsoft.com/office/drawing/2014/main" id="{02E8DA87-F312-42F8-91B2-0B40754D7035}"/>
+                <a16:creationId xmlns:a16="http://schemas.microsoft.com/office/drawing/2014/main" id="{B5B8FA2B-9EF4-40A1-A428-BC9D3F014582}"/>
               </a:ext>
             </a:extLst>
           </p:cNvPr>
@@ -5078,10 +5560,14 @@
           <a:lstStyle/>
           <a:p>
             <a:r>
-              <a:rPr lang="en-US" dirty="0"/>
-              <a:t>Engineer Section</a:t>
-            </a:r>
-            <a:endParaRPr lang="en-GB" dirty="0"/>
+              <a:rPr lang="en-US" dirty="0">
+                <a:latin typeface="Tenor sans" panose="02000000000000000000" pitchFamily="2" charset="0"/>
+              </a:rPr>
+              <a:t>UI Wireframe Section</a:t>
+            </a:r>
+            <a:endParaRPr lang="en-GB" dirty="0">
+              <a:latin typeface="Tenor sans" panose="02000000000000000000" pitchFamily="2" charset="0"/>
+            </a:endParaRPr>
           </a:p>
         </p:txBody>
       </p:sp>
@@ -5090,7 +5576,7 @@
           <p:cNvPr id="3" name="Tijdelijke aanduiding voor inhoud 2">
             <a:extLst>
               <a:ext uri="{FF2B5EF4-FFF2-40B4-BE49-F238E27FC236}">
-                <a16:creationId xmlns:a16="http://schemas.microsoft.com/office/drawing/2014/main" id="{344C3F8A-103E-4054-B3A7-14A1E5EA8B3C}"/>
+                <a16:creationId xmlns:a16="http://schemas.microsoft.com/office/drawing/2014/main" id="{C05C7F3F-C983-40AF-A325-29E0EBB65074}"/>
               </a:ext>
             </a:extLst>
           </p:cNvPr>
@@ -5106,26 +5592,16 @@
           <a:bodyPr/>
           <a:lstStyle/>
           <a:p>
-            <a:r>
-              <a:rPr lang="en-US" dirty="0"/>
-              <a:t>What did </a:t>
-            </a:r>
-            <a:r>
-              <a:rPr lang="en-US" dirty="0" err="1"/>
-              <a:t>glyn</a:t>
-            </a:r>
-            <a:r>
-              <a:rPr lang="en-US" dirty="0"/>
-              <a:t> do this week(doesn’t actually have to be presented by Glyn)</a:t>
-            </a:r>
-            <a:endParaRPr lang="en-GB" dirty="0"/>
+            <a:endParaRPr lang="en-GB" dirty="0">
+              <a:latin typeface="Tenor sans" panose="02000000000000000000" pitchFamily="2" charset="0"/>
+            </a:endParaRPr>
           </a:p>
         </p:txBody>
       </p:sp>
     </p:spTree>
     <p:extLst>
       <p:ext uri="{BB962C8B-B14F-4D97-AF65-F5344CB8AC3E}">
-        <p14:creationId xmlns:p14="http://schemas.microsoft.com/office/powerpoint/2010/main" val="2146667697"/>
+        <p14:creationId xmlns:p14="http://schemas.microsoft.com/office/powerpoint/2010/main" val="1663576427"/>
       </p:ext>
     </p:extLst>
   </p:cSld>
@@ -5157,7 +5633,7 @@
           <p:cNvPr id="2" name="Titel 1">
             <a:extLst>
               <a:ext uri="{FF2B5EF4-FFF2-40B4-BE49-F238E27FC236}">
-                <a16:creationId xmlns:a16="http://schemas.microsoft.com/office/drawing/2014/main" id="{935D41D1-D842-466B-9D07-26D825D94F85}"/>
+                <a16:creationId xmlns:a16="http://schemas.microsoft.com/office/drawing/2014/main" id="{03591E82-D8E9-48D8-AA2E-E00D34A77574}"/>
               </a:ext>
             </a:extLst>
           </p:cNvPr>
@@ -5174,10 +5650,20 @@
           <a:lstStyle/>
           <a:p>
             <a:r>
-              <a:rPr lang="en-US" dirty="0"/>
-              <a:t>Demo slide(gif/video?)</a:t>
-            </a:r>
-            <a:endParaRPr lang="en-GB" dirty="0"/>
+              <a:rPr lang="en-US" dirty="0" err="1">
+                <a:latin typeface="Tenor sans" panose="02000000000000000000" pitchFamily="2" charset="0"/>
+              </a:rPr>
+              <a:t>Moodboard</a:t>
+            </a:r>
+            <a:r>
+              <a:rPr lang="en-US" dirty="0">
+                <a:latin typeface="Tenor sans" panose="02000000000000000000" pitchFamily="2" charset="0"/>
+              </a:rPr>
+              <a:t> Section</a:t>
+            </a:r>
+            <a:endParaRPr lang="en-GB" dirty="0">
+              <a:latin typeface="Tenor sans" panose="02000000000000000000" pitchFamily="2" charset="0"/>
+            </a:endParaRPr>
           </a:p>
         </p:txBody>
       </p:sp>
@@ -5186,7 +5672,7 @@
           <p:cNvPr id="3" name="Tijdelijke aanduiding voor inhoud 2">
             <a:extLst>
               <a:ext uri="{FF2B5EF4-FFF2-40B4-BE49-F238E27FC236}">
-                <a16:creationId xmlns:a16="http://schemas.microsoft.com/office/drawing/2014/main" id="{95C51B7B-37EA-4057-B543-092206AE4C50}"/>
+                <a16:creationId xmlns:a16="http://schemas.microsoft.com/office/drawing/2014/main" id="{1EF16F8F-EDDD-47C2-BF01-A484955D2BB7}"/>
               </a:ext>
             </a:extLst>
           </p:cNvPr>
@@ -5202,14 +5688,16 @@
           <a:bodyPr/>
           <a:lstStyle/>
           <a:p>
-            <a:endParaRPr lang="en-GB"/>
+            <a:endParaRPr lang="en-GB" dirty="0">
+              <a:latin typeface="Tenor sans" panose="02000000000000000000" pitchFamily="2" charset="0"/>
+            </a:endParaRPr>
           </a:p>
         </p:txBody>
       </p:sp>
     </p:spTree>
     <p:extLst>
       <p:ext uri="{BB962C8B-B14F-4D97-AF65-F5344CB8AC3E}">
-        <p14:creationId xmlns:p14="http://schemas.microsoft.com/office/powerpoint/2010/main" val="1736660864"/>
+        <p14:creationId xmlns:p14="http://schemas.microsoft.com/office/powerpoint/2010/main" val="576153207"/>
       </p:ext>
     </p:extLst>
   </p:cSld>
@@ -5241,6 +5729,384 @@
           <p:cNvPr id="2" name="Titel 1">
             <a:extLst>
               <a:ext uri="{FF2B5EF4-FFF2-40B4-BE49-F238E27FC236}">
+                <a16:creationId xmlns:a16="http://schemas.microsoft.com/office/drawing/2014/main" id="{7A7D6EC4-674B-4668-BEA3-F4BFB0C211BE}"/>
+              </a:ext>
+            </a:extLst>
+          </p:cNvPr>
+          <p:cNvSpPr>
+            <a:spLocks noGrp="1"/>
+          </p:cNvSpPr>
+          <p:nvPr>
+            <p:ph type="title"/>
+          </p:nvPr>
+        </p:nvSpPr>
+        <p:spPr/>
+        <p:txBody>
+          <a:bodyPr/>
+          <a:lstStyle/>
+          <a:p>
+            <a:r>
+              <a:rPr lang="en-US" dirty="0">
+                <a:latin typeface="Tenor sans" panose="02000000000000000000" pitchFamily="2" charset="0"/>
+              </a:rPr>
+              <a:t>Stylesheet Section</a:t>
+            </a:r>
+            <a:endParaRPr lang="en-GB" dirty="0">
+              <a:latin typeface="Tenor sans" panose="02000000000000000000" pitchFamily="2" charset="0"/>
+            </a:endParaRPr>
+          </a:p>
+        </p:txBody>
+      </p:sp>
+      <p:sp>
+        <p:nvSpPr>
+          <p:cNvPr id="3" name="Tijdelijke aanduiding voor inhoud 2">
+            <a:extLst>
+              <a:ext uri="{FF2B5EF4-FFF2-40B4-BE49-F238E27FC236}">
+                <a16:creationId xmlns:a16="http://schemas.microsoft.com/office/drawing/2014/main" id="{05E1BF49-8E88-4D6D-987E-CCBC52B45BD6}"/>
+              </a:ext>
+            </a:extLst>
+          </p:cNvPr>
+          <p:cNvSpPr>
+            <a:spLocks noGrp="1"/>
+          </p:cNvSpPr>
+          <p:nvPr>
+            <p:ph idx="1"/>
+          </p:nvPr>
+        </p:nvSpPr>
+        <p:spPr/>
+        <p:txBody>
+          <a:bodyPr/>
+          <a:lstStyle/>
+          <a:p>
+            <a:endParaRPr lang="en-GB" dirty="0">
+              <a:latin typeface="Tenor sans" panose="02000000000000000000" pitchFamily="2" charset="0"/>
+            </a:endParaRPr>
+          </a:p>
+        </p:txBody>
+      </p:sp>
+    </p:spTree>
+    <p:extLst>
+      <p:ext uri="{BB962C8B-B14F-4D97-AF65-F5344CB8AC3E}">
+        <p14:creationId xmlns:p14="http://schemas.microsoft.com/office/powerpoint/2010/main" val="2242478784"/>
+      </p:ext>
+    </p:extLst>
+  </p:cSld>
+  <p:clrMapOvr>
+    <a:masterClrMapping/>
+  </p:clrMapOvr>
+</p:sld>
+</file>
+
+<file path=ppt/slides/slide14.xml><?xml version="1.0" encoding="utf-8"?>
+<p:sld xmlns:a="http://schemas.openxmlformats.org/drawingml/2006/main" xmlns:r="http://schemas.openxmlformats.org/officeDocument/2006/relationships" xmlns:p="http://schemas.openxmlformats.org/presentationml/2006/main">
+  <p:cSld>
+    <p:spTree>
+      <p:nvGrpSpPr>
+        <p:cNvPr id="1" name=""/>
+        <p:cNvGrpSpPr/>
+        <p:nvPr/>
+      </p:nvGrpSpPr>
+      <p:grpSpPr>
+        <a:xfrm>
+          <a:off x="0" y="0"/>
+          <a:ext cx="0" cy="0"/>
+          <a:chOff x="0" y="0"/>
+          <a:chExt cx="0" cy="0"/>
+        </a:xfrm>
+      </p:grpSpPr>
+      <p:sp>
+        <p:nvSpPr>
+          <p:cNvPr id="2" name="Titel 1">
+            <a:extLst>
+              <a:ext uri="{FF2B5EF4-FFF2-40B4-BE49-F238E27FC236}">
+                <a16:creationId xmlns:a16="http://schemas.microsoft.com/office/drawing/2014/main" id="{81A46E86-88FF-49A3-A35E-5DBB04ADCBDE}"/>
+              </a:ext>
+            </a:extLst>
+          </p:cNvPr>
+          <p:cNvSpPr>
+            <a:spLocks noGrp="1"/>
+          </p:cNvSpPr>
+          <p:nvPr>
+            <p:ph type="title"/>
+          </p:nvPr>
+        </p:nvSpPr>
+        <p:spPr/>
+        <p:txBody>
+          <a:bodyPr/>
+          <a:lstStyle/>
+          <a:p>
+            <a:r>
+              <a:rPr lang="en-US" dirty="0">
+                <a:latin typeface="Tenor sans" panose="02000000000000000000" pitchFamily="2" charset="0"/>
+              </a:rPr>
+              <a:t>Concept Art Section</a:t>
+            </a:r>
+            <a:endParaRPr lang="en-GB" dirty="0">
+              <a:latin typeface="Tenor sans" panose="02000000000000000000" pitchFamily="2" charset="0"/>
+            </a:endParaRPr>
+          </a:p>
+        </p:txBody>
+      </p:sp>
+      <p:sp>
+        <p:nvSpPr>
+          <p:cNvPr id="3" name="Tijdelijke aanduiding voor inhoud 2">
+            <a:extLst>
+              <a:ext uri="{FF2B5EF4-FFF2-40B4-BE49-F238E27FC236}">
+                <a16:creationId xmlns:a16="http://schemas.microsoft.com/office/drawing/2014/main" id="{B6168058-30A4-4F3D-998A-8E91A73047A4}"/>
+              </a:ext>
+            </a:extLst>
+          </p:cNvPr>
+          <p:cNvSpPr>
+            <a:spLocks noGrp="1"/>
+          </p:cNvSpPr>
+          <p:nvPr>
+            <p:ph idx="1"/>
+          </p:nvPr>
+        </p:nvSpPr>
+        <p:spPr/>
+        <p:txBody>
+          <a:bodyPr/>
+          <a:lstStyle/>
+          <a:p>
+            <a:endParaRPr lang="en-GB" dirty="0">
+              <a:latin typeface="Tenor sans" panose="02000000000000000000" pitchFamily="2" charset="0"/>
+            </a:endParaRPr>
+          </a:p>
+        </p:txBody>
+      </p:sp>
+    </p:spTree>
+    <p:extLst>
+      <p:ext uri="{BB962C8B-B14F-4D97-AF65-F5344CB8AC3E}">
+        <p14:creationId xmlns:p14="http://schemas.microsoft.com/office/powerpoint/2010/main" val="4151834702"/>
+      </p:ext>
+    </p:extLst>
+  </p:cSld>
+  <p:clrMapOvr>
+    <a:masterClrMapping/>
+  </p:clrMapOvr>
+</p:sld>
+</file>
+
+<file path=ppt/slides/slide15.xml><?xml version="1.0" encoding="utf-8"?>
+<p:sld xmlns:a="http://schemas.openxmlformats.org/drawingml/2006/main" xmlns:r="http://schemas.openxmlformats.org/officeDocument/2006/relationships" xmlns:p="http://schemas.openxmlformats.org/presentationml/2006/main">
+  <p:cSld>
+    <p:spTree>
+      <p:nvGrpSpPr>
+        <p:cNvPr id="1" name=""/>
+        <p:cNvGrpSpPr/>
+        <p:nvPr/>
+      </p:nvGrpSpPr>
+      <p:grpSpPr>
+        <a:xfrm>
+          <a:off x="0" y="0"/>
+          <a:ext cx="0" cy="0"/>
+          <a:chOff x="0" y="0"/>
+          <a:chExt cx="0" cy="0"/>
+        </a:xfrm>
+      </p:grpSpPr>
+      <p:sp>
+        <p:nvSpPr>
+          <p:cNvPr id="2" name="Titel 1">
+            <a:extLst>
+              <a:ext uri="{FF2B5EF4-FFF2-40B4-BE49-F238E27FC236}">
+                <a16:creationId xmlns:a16="http://schemas.microsoft.com/office/drawing/2014/main" id="{02E8DA87-F312-42F8-91B2-0B40754D7035}"/>
+              </a:ext>
+            </a:extLst>
+          </p:cNvPr>
+          <p:cNvSpPr>
+            <a:spLocks noGrp="1"/>
+          </p:cNvSpPr>
+          <p:nvPr>
+            <p:ph type="title"/>
+          </p:nvPr>
+        </p:nvSpPr>
+        <p:spPr/>
+        <p:txBody>
+          <a:bodyPr/>
+          <a:lstStyle/>
+          <a:p>
+            <a:r>
+              <a:rPr lang="en-US" dirty="0">
+                <a:latin typeface="Tenor sans" panose="02000000000000000000" pitchFamily="2" charset="0"/>
+              </a:rPr>
+              <a:t>Engineer Section</a:t>
+            </a:r>
+            <a:endParaRPr lang="en-GB" dirty="0">
+              <a:latin typeface="Tenor sans" panose="02000000000000000000" pitchFamily="2" charset="0"/>
+            </a:endParaRPr>
+          </a:p>
+        </p:txBody>
+      </p:sp>
+      <p:sp>
+        <p:nvSpPr>
+          <p:cNvPr id="3" name="Tijdelijke aanduiding voor inhoud 2">
+            <a:extLst>
+              <a:ext uri="{FF2B5EF4-FFF2-40B4-BE49-F238E27FC236}">
+                <a16:creationId xmlns:a16="http://schemas.microsoft.com/office/drawing/2014/main" id="{344C3F8A-103E-4054-B3A7-14A1E5EA8B3C}"/>
+              </a:ext>
+            </a:extLst>
+          </p:cNvPr>
+          <p:cNvSpPr>
+            <a:spLocks noGrp="1"/>
+          </p:cNvSpPr>
+          <p:nvPr>
+            <p:ph idx="1"/>
+          </p:nvPr>
+        </p:nvSpPr>
+        <p:spPr/>
+        <p:txBody>
+          <a:bodyPr/>
+          <a:lstStyle/>
+          <a:p>
+            <a:r>
+              <a:rPr lang="en-US" dirty="0">
+                <a:latin typeface="Tenor sans" panose="02000000000000000000" pitchFamily="2" charset="0"/>
+              </a:rPr>
+              <a:t>What did </a:t>
+            </a:r>
+            <a:r>
+              <a:rPr lang="en-US" dirty="0" err="1">
+                <a:latin typeface="Tenor sans" panose="02000000000000000000" pitchFamily="2" charset="0"/>
+              </a:rPr>
+              <a:t>glyn</a:t>
+            </a:r>
+            <a:r>
+              <a:rPr lang="en-US" dirty="0">
+                <a:latin typeface="Tenor sans" panose="02000000000000000000" pitchFamily="2" charset="0"/>
+              </a:rPr>
+              <a:t> do this week(doesn’t actually have to be presented by Glyn)</a:t>
+            </a:r>
+            <a:endParaRPr lang="en-GB" dirty="0">
+              <a:latin typeface="Tenor sans" panose="02000000000000000000" pitchFamily="2" charset="0"/>
+            </a:endParaRPr>
+          </a:p>
+        </p:txBody>
+      </p:sp>
+    </p:spTree>
+    <p:extLst>
+      <p:ext uri="{BB962C8B-B14F-4D97-AF65-F5344CB8AC3E}">
+        <p14:creationId xmlns:p14="http://schemas.microsoft.com/office/powerpoint/2010/main" val="2146667697"/>
+      </p:ext>
+    </p:extLst>
+  </p:cSld>
+  <p:clrMapOvr>
+    <a:masterClrMapping/>
+  </p:clrMapOvr>
+</p:sld>
+</file>
+
+<file path=ppt/slides/slide16.xml><?xml version="1.0" encoding="utf-8"?>
+<p:sld xmlns:a="http://schemas.openxmlformats.org/drawingml/2006/main" xmlns:r="http://schemas.openxmlformats.org/officeDocument/2006/relationships" xmlns:p="http://schemas.openxmlformats.org/presentationml/2006/main">
+  <p:cSld>
+    <p:spTree>
+      <p:nvGrpSpPr>
+        <p:cNvPr id="1" name=""/>
+        <p:cNvGrpSpPr/>
+        <p:nvPr/>
+      </p:nvGrpSpPr>
+      <p:grpSpPr>
+        <a:xfrm>
+          <a:off x="0" y="0"/>
+          <a:ext cx="0" cy="0"/>
+          <a:chOff x="0" y="0"/>
+          <a:chExt cx="0" cy="0"/>
+        </a:xfrm>
+      </p:grpSpPr>
+      <p:sp>
+        <p:nvSpPr>
+          <p:cNvPr id="2" name="Titel 1">
+            <a:extLst>
+              <a:ext uri="{FF2B5EF4-FFF2-40B4-BE49-F238E27FC236}">
+                <a16:creationId xmlns:a16="http://schemas.microsoft.com/office/drawing/2014/main" id="{935D41D1-D842-466B-9D07-26D825D94F85}"/>
+              </a:ext>
+            </a:extLst>
+          </p:cNvPr>
+          <p:cNvSpPr>
+            <a:spLocks noGrp="1"/>
+          </p:cNvSpPr>
+          <p:nvPr>
+            <p:ph type="title"/>
+          </p:nvPr>
+        </p:nvSpPr>
+        <p:spPr/>
+        <p:txBody>
+          <a:bodyPr/>
+          <a:lstStyle/>
+          <a:p>
+            <a:r>
+              <a:rPr lang="en-US" dirty="0">
+                <a:latin typeface="Tenor sans" panose="02000000000000000000" pitchFamily="2" charset="0"/>
+              </a:rPr>
+              <a:t>Demo slide(gif/video?)</a:t>
+            </a:r>
+            <a:endParaRPr lang="en-GB" dirty="0">
+              <a:latin typeface="Tenor sans" panose="02000000000000000000" pitchFamily="2" charset="0"/>
+            </a:endParaRPr>
+          </a:p>
+        </p:txBody>
+      </p:sp>
+      <p:sp>
+        <p:nvSpPr>
+          <p:cNvPr id="3" name="Tijdelijke aanduiding voor inhoud 2">
+            <a:extLst>
+              <a:ext uri="{FF2B5EF4-FFF2-40B4-BE49-F238E27FC236}">
+                <a16:creationId xmlns:a16="http://schemas.microsoft.com/office/drawing/2014/main" id="{95C51B7B-37EA-4057-B543-092206AE4C50}"/>
+              </a:ext>
+            </a:extLst>
+          </p:cNvPr>
+          <p:cNvSpPr>
+            <a:spLocks noGrp="1"/>
+          </p:cNvSpPr>
+          <p:nvPr>
+            <p:ph idx="1"/>
+          </p:nvPr>
+        </p:nvSpPr>
+        <p:spPr/>
+        <p:txBody>
+          <a:bodyPr/>
+          <a:lstStyle/>
+          <a:p>
+            <a:endParaRPr lang="en-GB" dirty="0">
+              <a:latin typeface="Tenor sans" panose="02000000000000000000" pitchFamily="2" charset="0"/>
+            </a:endParaRPr>
+          </a:p>
+        </p:txBody>
+      </p:sp>
+    </p:spTree>
+    <p:extLst>
+      <p:ext uri="{BB962C8B-B14F-4D97-AF65-F5344CB8AC3E}">
+        <p14:creationId xmlns:p14="http://schemas.microsoft.com/office/powerpoint/2010/main" val="1736660864"/>
+      </p:ext>
+    </p:extLst>
+  </p:cSld>
+  <p:clrMapOvr>
+    <a:masterClrMapping/>
+  </p:clrMapOvr>
+</p:sld>
+</file>
+
+<file path=ppt/slides/slide17.xml><?xml version="1.0" encoding="utf-8"?>
+<p:sld xmlns:a="http://schemas.openxmlformats.org/drawingml/2006/main" xmlns:r="http://schemas.openxmlformats.org/officeDocument/2006/relationships" xmlns:p="http://schemas.openxmlformats.org/presentationml/2006/main">
+  <p:cSld>
+    <p:spTree>
+      <p:nvGrpSpPr>
+        <p:cNvPr id="1" name=""/>
+        <p:cNvGrpSpPr/>
+        <p:nvPr/>
+      </p:nvGrpSpPr>
+      <p:grpSpPr>
+        <a:xfrm>
+          <a:off x="0" y="0"/>
+          <a:ext cx="0" cy="0"/>
+          <a:chOff x="0" y="0"/>
+          <a:chExt cx="0" cy="0"/>
+        </a:xfrm>
+      </p:grpSpPr>
+      <p:sp>
+        <p:nvSpPr>
+          <p:cNvPr id="2" name="Titel 1">
+            <a:extLst>
+              <a:ext uri="{FF2B5EF4-FFF2-40B4-BE49-F238E27FC236}">
                 <a16:creationId xmlns:a16="http://schemas.microsoft.com/office/drawing/2014/main" id="{8F3A706D-1495-4689-91B2-0105D2C67C05}"/>
               </a:ext>
             </a:extLst>
@@ -5252,16 +6118,25 @@
             <p:ph type="title"/>
           </p:nvPr>
         </p:nvSpPr>
-        <p:spPr/>
-        <p:txBody>
-          <a:bodyPr/>
-          <a:lstStyle/>
-          <a:p>
-            <a:r>
-              <a:rPr lang="en-US" dirty="0"/>
+        <p:spPr>
+          <a:xfrm>
+            <a:off x="838200" y="336845"/>
+            <a:ext cx="10515600" cy="1325563"/>
+          </a:xfrm>
+        </p:spPr>
+        <p:txBody>
+          <a:bodyPr/>
+          <a:lstStyle/>
+          <a:p>
+            <a:r>
+              <a:rPr lang="en-US" dirty="0">
+                <a:latin typeface="Tenor sans" panose="02000000000000000000" pitchFamily="2" charset="0"/>
+              </a:rPr>
               <a:t>Next week</a:t>
             </a:r>
-            <a:endParaRPr lang="en-GB" dirty="0"/>
+            <a:endParaRPr lang="en-GB" dirty="0">
+              <a:latin typeface="Tenor sans" panose="02000000000000000000" pitchFamily="2" charset="0"/>
+            </a:endParaRPr>
           </a:p>
         </p:txBody>
       </p:sp>
@@ -5286,7 +6161,9 @@
           <a:bodyPr/>
           <a:lstStyle/>
           <a:p>
-            <a:endParaRPr lang="en-GB"/>
+            <a:endParaRPr lang="en-GB" dirty="0">
+              <a:latin typeface="Tenor sans" panose="02000000000000000000" pitchFamily="2" charset="0"/>
+            </a:endParaRPr>
           </a:p>
         </p:txBody>
       </p:sp>
@@ -5294,6 +6171,113 @@
     <p:extLst>
       <p:ext uri="{BB962C8B-B14F-4D97-AF65-F5344CB8AC3E}">
         <p14:creationId xmlns:p14="http://schemas.microsoft.com/office/powerpoint/2010/main" val="3166900381"/>
+      </p:ext>
+    </p:extLst>
+  </p:cSld>
+  <p:clrMapOvr>
+    <a:masterClrMapping/>
+  </p:clrMapOvr>
+</p:sld>
+</file>
+
+<file path=ppt/slides/slide18.xml><?xml version="1.0" encoding="utf-8"?>
+<p:sld xmlns:a="http://schemas.openxmlformats.org/drawingml/2006/main" xmlns:r="http://schemas.openxmlformats.org/officeDocument/2006/relationships" xmlns:p="http://schemas.openxmlformats.org/presentationml/2006/main">
+  <p:cSld>
+    <p:spTree>
+      <p:nvGrpSpPr>
+        <p:cNvPr id="1" name=""/>
+        <p:cNvGrpSpPr/>
+        <p:nvPr/>
+      </p:nvGrpSpPr>
+      <p:grpSpPr>
+        <a:xfrm>
+          <a:off x="0" y="0"/>
+          <a:ext cx="0" cy="0"/>
+          <a:chOff x="0" y="0"/>
+          <a:chExt cx="0" cy="0"/>
+        </a:xfrm>
+      </p:grpSpPr>
+      <p:sp>
+        <p:nvSpPr>
+          <p:cNvPr id="2" name="Titel 1">
+            <a:extLst>
+              <a:ext uri="{FF2B5EF4-FFF2-40B4-BE49-F238E27FC236}">
+                <a16:creationId xmlns:a16="http://schemas.microsoft.com/office/drawing/2014/main" id="{65806CCE-9A3D-4E88-B701-5B56D3B46574}"/>
+              </a:ext>
+            </a:extLst>
+          </p:cNvPr>
+          <p:cNvSpPr>
+            <a:spLocks noGrp="1"/>
+          </p:cNvSpPr>
+          <p:nvPr>
+            <p:ph type="title"/>
+          </p:nvPr>
+        </p:nvSpPr>
+        <p:spPr>
+          <a:xfrm>
+            <a:off x="838200" y="1440655"/>
+            <a:ext cx="10515600" cy="1325563"/>
+          </a:xfrm>
+        </p:spPr>
+        <p:txBody>
+          <a:bodyPr/>
+          <a:lstStyle/>
+          <a:p>
+            <a:pPr algn="ctr"/>
+            <a:r>
+              <a:rPr lang="en-US" dirty="0">
+                <a:latin typeface="Carter one" panose="03080802040405060005" pitchFamily="66" charset="0"/>
+                <a:ea typeface="Carter one" panose="03080802040405060005" pitchFamily="66" charset="0"/>
+              </a:rPr>
+              <a:t>Thank you for listening</a:t>
+            </a:r>
+            <a:endParaRPr lang="en-GB" dirty="0">
+              <a:latin typeface="Carter one" panose="03080802040405060005" pitchFamily="66" charset="0"/>
+              <a:ea typeface="Carter one" panose="03080802040405060005" pitchFamily="66" charset="0"/>
+            </a:endParaRPr>
+          </a:p>
+        </p:txBody>
+      </p:sp>
+      <p:pic>
+        <p:nvPicPr>
+          <p:cNvPr id="4" name="Tijdelijke aanduiding voor inhoud 4">
+            <a:extLst>
+              <a:ext uri="{FF2B5EF4-FFF2-40B4-BE49-F238E27FC236}">
+                <a16:creationId xmlns:a16="http://schemas.microsoft.com/office/drawing/2014/main" id="{FAFFD684-1717-4A59-8491-A1D7C19CC7CA}"/>
+              </a:ext>
+            </a:extLst>
+          </p:cNvPr>
+          <p:cNvPicPr>
+            <a:picLocks noChangeAspect="1"/>
+          </p:cNvPicPr>
+          <p:nvPr/>
+        </p:nvPicPr>
+        <p:blipFill>
+          <a:blip r:embed="rId2">
+            <a:extLst>
+              <a:ext uri="{28A0092B-C50C-407E-A947-70E740481C1C}">
+                <a14:useLocalDpi xmlns:a14="http://schemas.microsoft.com/office/drawing/2010/main" val="0"/>
+              </a:ext>
+            </a:extLst>
+          </a:blip>
+          <a:stretch>
+            <a:fillRect/>
+          </a:stretch>
+        </p:blipFill>
+        <p:spPr>
+          <a:xfrm>
+            <a:off x="4571997" y="2492841"/>
+            <a:ext cx="3048006" cy="3048006"/>
+          </a:xfrm>
+          <a:prstGeom prst="rect">
+            <a:avLst/>
+          </a:prstGeom>
+        </p:spPr>
+      </p:pic>
+    </p:spTree>
+    <p:extLst>
+      <p:ext uri="{BB962C8B-B14F-4D97-AF65-F5344CB8AC3E}">
+        <p14:creationId xmlns:p14="http://schemas.microsoft.com/office/powerpoint/2010/main" val="2482981303"/>
       </p:ext>
     </p:extLst>
   </p:cSld>
@@ -5342,10 +6326,14 @@
           <a:lstStyle/>
           <a:p>
             <a:r>
-              <a:rPr lang="en-US" dirty="0"/>
+              <a:rPr lang="en-US" dirty="0">
+                <a:latin typeface="Tenor sans" panose="02000000000000000000" pitchFamily="2" charset="0"/>
+              </a:rPr>
               <a:t>The Team</a:t>
             </a:r>
-            <a:endParaRPr lang="en-GB" dirty="0"/>
+            <a:endParaRPr lang="en-GB" dirty="0">
+              <a:latin typeface="Tenor sans" panose="02000000000000000000" pitchFamily="2" charset="0"/>
+            </a:endParaRPr>
           </a:p>
         </p:txBody>
       </p:sp>
@@ -5371,59 +6359,128 @@
           <a:lstStyle/>
           <a:p>
             <a:r>
-              <a:rPr lang="en-US" dirty="0"/>
+              <a:rPr lang="en-US" dirty="0">
+                <a:latin typeface="Tenor sans" panose="02000000000000000000" pitchFamily="2" charset="0"/>
+              </a:rPr>
               <a:t>Rob O’Connor			Artist</a:t>
             </a:r>
           </a:p>
           <a:p>
             <a:r>
-              <a:rPr lang="en-US" dirty="0"/>
+              <a:rPr lang="en-US" dirty="0">
+                <a:latin typeface="Tenor sans" panose="02000000000000000000" pitchFamily="2" charset="0"/>
+              </a:rPr>
               <a:t>Tamara </a:t>
             </a:r>
             <a:r>
-              <a:rPr lang="en-US" dirty="0" err="1"/>
+              <a:rPr lang="en-US" dirty="0" err="1">
+                <a:latin typeface="Tenor sans" panose="02000000000000000000" pitchFamily="2" charset="0"/>
+              </a:rPr>
               <a:t>Hooijmans</a:t>
             </a:r>
             <a:r>
-              <a:rPr lang="en-US" dirty="0"/>
+              <a:rPr lang="en-US" dirty="0">
+                <a:latin typeface="Tenor sans" panose="02000000000000000000" pitchFamily="2" charset="0"/>
+              </a:rPr>
               <a:t>		Artist</a:t>
             </a:r>
           </a:p>
           <a:p>
             <a:r>
-              <a:rPr lang="en-US" dirty="0"/>
+              <a:rPr lang="en-US" dirty="0">
+                <a:latin typeface="Tenor sans" panose="02000000000000000000" pitchFamily="2" charset="0"/>
+              </a:rPr>
               <a:t>Humam Abud Allah		Artist</a:t>
             </a:r>
           </a:p>
           <a:p>
             <a:r>
-              <a:rPr lang="en-US" dirty="0"/>
-              <a:t>Olivier de Haan			Designer</a:t>
-            </a:r>
-          </a:p>
-          <a:p>
-            <a:r>
-              <a:rPr lang="en-US" dirty="0"/>
+              <a:rPr lang="en-US" dirty="0">
+                <a:latin typeface="Tenor sans" panose="02000000000000000000" pitchFamily="2" charset="0"/>
+              </a:rPr>
+              <a:t>Olivier de Haan		Designer</a:t>
+            </a:r>
+          </a:p>
+          <a:p>
+            <a:r>
+              <a:rPr lang="en-US" dirty="0">
+                <a:latin typeface="Tenor sans" panose="02000000000000000000" pitchFamily="2" charset="0"/>
+              </a:rPr>
               <a:t>Rick Oosthof			Designer</a:t>
             </a:r>
           </a:p>
           <a:p>
             <a:r>
-              <a:rPr lang="en-US" dirty="0"/>
+              <a:rPr lang="en-US" dirty="0">
+                <a:latin typeface="Tenor sans" panose="02000000000000000000" pitchFamily="2" charset="0"/>
+              </a:rPr>
               <a:t>Glyn </a:t>
             </a:r>
             <a:r>
-              <a:rPr lang="en-US" dirty="0" err="1"/>
+              <a:rPr lang="en-US" dirty="0" err="1">
+                <a:latin typeface="Tenor sans" panose="02000000000000000000" pitchFamily="2" charset="0"/>
+              </a:rPr>
               <a:t>Leine</a:t>
             </a:r>
             <a:r>
-              <a:rPr lang="en-US" dirty="0"/>
-              <a:t>				Engineer</a:t>
-            </a:r>
-            <a:endParaRPr lang="en-GB" dirty="0"/>
-          </a:p>
-        </p:txBody>
-      </p:sp>
+              <a:rPr lang="en-US" dirty="0">
+                <a:latin typeface="Tenor sans" panose="02000000000000000000" pitchFamily="2" charset="0"/>
+              </a:rPr>
+              <a:t>			Engineer</a:t>
+            </a:r>
+            <a:endParaRPr lang="en-GB" dirty="0">
+              <a:latin typeface="Tenor sans" panose="02000000000000000000" pitchFamily="2" charset="0"/>
+            </a:endParaRPr>
+          </a:p>
+        </p:txBody>
+      </p:sp>
+      <p:pic>
+        <p:nvPicPr>
+          <p:cNvPr id="2052" name="Picture 4" descr="Afbeeldingsresultaat voor team icon">
+            <a:extLst>
+              <a:ext uri="{FF2B5EF4-FFF2-40B4-BE49-F238E27FC236}">
+                <a16:creationId xmlns:a16="http://schemas.microsoft.com/office/drawing/2014/main" id="{1DC68712-DE04-4161-A0E4-0400BD4E4307}"/>
+              </a:ext>
+            </a:extLst>
+          </p:cNvPr>
+          <p:cNvPicPr>
+            <a:picLocks noChangeAspect="1" noChangeArrowheads="1"/>
+          </p:cNvPicPr>
+          <p:nvPr/>
+        </p:nvPicPr>
+        <p:blipFill>
+          <a:blip r:embed="rId3">
+            <a:extLst>
+              <a:ext uri="{28A0092B-C50C-407E-A947-70E740481C1C}">
+                <a14:useLocalDpi xmlns:a14="http://schemas.microsoft.com/office/drawing/2010/main" val="0"/>
+              </a:ext>
+            </a:extLst>
+          </a:blip>
+          <a:srcRect/>
+          <a:stretch>
+            <a:fillRect/>
+          </a:stretch>
+        </p:blipFill>
+        <p:spPr bwMode="auto">
+          <a:xfrm>
+            <a:off x="5334000" y="75406"/>
+            <a:ext cx="1905000" cy="1905000"/>
+          </a:xfrm>
+          <a:prstGeom prst="rect">
+            <a:avLst/>
+          </a:prstGeom>
+          <a:noFill/>
+          <a:extLst>
+            <a:ext uri="{909E8E84-426E-40DD-AFC4-6F175D3DCCD1}">
+              <a14:hiddenFill xmlns:a14="http://schemas.microsoft.com/office/drawing/2010/main">
+                <a:solidFill>
+                  <a:srgbClr val="FFFFFF"/>
+                </a:solidFill>
+              </a14:hiddenFill>
+            </a:ext>
+          </a:extLst>
+        </p:spPr>
+      </p:pic>
     </p:spTree>
     <p:extLst>
       <p:ext uri="{BB962C8B-B14F-4D97-AF65-F5344CB8AC3E}">
@@ -5628,6 +6685,45 @@
           <a:chExt cx="0" cy="0"/>
         </a:xfrm>
       </p:grpSpPr>
+      <p:pic>
+        <p:nvPicPr>
+          <p:cNvPr id="4" name="Afbeelding 3" descr="Afbeeldingsresultaat voor Ocean Cleanup">
+            <a:extLst>
+              <a:ext uri="{FF2B5EF4-FFF2-40B4-BE49-F238E27FC236}">
+                <a16:creationId xmlns:a16="http://schemas.microsoft.com/office/drawing/2014/main" id="{5433E3FD-B1E9-4D19-ABAA-1C7E18198365}"/>
+              </a:ext>
+            </a:extLst>
+          </p:cNvPr>
+          <p:cNvPicPr/>
+          <p:nvPr/>
+        </p:nvPicPr>
+        <p:blipFill>
+          <a:blip r:embed="rId3">
+            <a:extLst>
+              <a:ext uri="{28A0092B-C50C-407E-A947-70E740481C1C}">
+                <a14:useLocalDpi xmlns:a14="http://schemas.microsoft.com/office/drawing/2010/main" val="0"/>
+              </a:ext>
+            </a:extLst>
+          </a:blip>
+          <a:srcRect/>
+          <a:stretch>
+            <a:fillRect/>
+          </a:stretch>
+        </p:blipFill>
+        <p:spPr bwMode="auto">
+          <a:xfrm>
+            <a:off x="0" y="-65183"/>
+            <a:ext cx="12192000" cy="8132953"/>
+          </a:xfrm>
+          <a:prstGeom prst="rect">
+            <a:avLst/>
+          </a:prstGeom>
+          <a:noFill/>
+          <a:ln>
+            <a:noFill/>
+          </a:ln>
+        </p:spPr>
+      </p:pic>
       <p:sp>
         <p:nvSpPr>
           <p:cNvPr id="2" name="Titel 1">
@@ -5644,41 +6740,23 @@
             <p:ph type="title"/>
           </p:nvPr>
         </p:nvSpPr>
-        <p:spPr/>
-        <p:txBody>
-          <a:bodyPr/>
-          <a:lstStyle/>
-          <a:p>
-            <a:r>
-              <a:rPr lang="en-US" dirty="0"/>
-              <a:t>Research Section</a:t>
+        <p:spPr>
+          <a:xfrm>
+            <a:off x="3232998" y="3147213"/>
+            <a:ext cx="2677997" cy="1325563"/>
+          </a:xfrm>
+        </p:spPr>
+        <p:txBody>
+          <a:bodyPr/>
+          <a:lstStyle/>
+          <a:p>
+            <a:r>
+              <a:rPr lang="en-US" dirty="0">
+                <a:latin typeface="Tenor sans" panose="02000000000000000000" pitchFamily="2" charset="0"/>
+              </a:rPr>
+              <a:t>Research</a:t>
             </a:r>
             <a:endParaRPr lang="en-GB" dirty="0"/>
-          </a:p>
-        </p:txBody>
-      </p:sp>
-      <p:sp>
-        <p:nvSpPr>
-          <p:cNvPr id="3" name="Tijdelijke aanduiding voor inhoud 2">
-            <a:extLst>
-              <a:ext uri="{FF2B5EF4-FFF2-40B4-BE49-F238E27FC236}">
-                <a16:creationId xmlns:a16="http://schemas.microsoft.com/office/drawing/2014/main" id="{EC69BE5E-55CA-465F-BA17-2E669BF3410C}"/>
-              </a:ext>
-            </a:extLst>
-          </p:cNvPr>
-          <p:cNvSpPr>
-            <a:spLocks noGrp="1"/>
-          </p:cNvSpPr>
-          <p:nvPr>
-            <p:ph idx="1"/>
-          </p:nvPr>
-        </p:nvSpPr>
-        <p:spPr/>
-        <p:txBody>
-          <a:bodyPr/>
-          <a:lstStyle/>
-          <a:p>
-            <a:endParaRPr lang="en-GB"/>
           </a:p>
         </p:txBody>
       </p:sp>
@@ -5698,6 +6776,14 @@
 <file path=ppt/slides/slide5.xml><?xml version="1.0" encoding="utf-8"?>
 <p:sld xmlns:a="http://schemas.openxmlformats.org/drawingml/2006/main" xmlns:r="http://schemas.openxmlformats.org/officeDocument/2006/relationships" xmlns:p="http://schemas.openxmlformats.org/presentationml/2006/main">
   <p:cSld>
+    <p:bg>
+      <p:bgPr>
+        <a:solidFill>
+          <a:schemeClr val="tx1"/>
+        </a:solidFill>
+        <a:effectLst/>
+      </p:bgPr>
+    </p:bg>
     <p:spTree>
       <p:nvGrpSpPr>
         <p:cNvPr id="1" name=""/>
@@ -5717,7 +6803,7 @@
           <p:cNvPr id="2" name="Titel 1">
             <a:extLst>
               <a:ext uri="{FF2B5EF4-FFF2-40B4-BE49-F238E27FC236}">
-                <a16:creationId xmlns:a16="http://schemas.microsoft.com/office/drawing/2014/main" id="{ABFC3A42-D7C3-4A82-8955-E949E4508BF0}"/>
+                <a16:creationId xmlns:a16="http://schemas.microsoft.com/office/drawing/2014/main" id="{6F4FDE6A-8361-40EE-BF39-A92A82AAAF21}"/>
               </a:ext>
             </a:extLst>
           </p:cNvPr>
@@ -5728,16 +6814,17 @@
             <p:ph type="title"/>
           </p:nvPr>
         </p:nvSpPr>
-        <p:spPr/>
-        <p:txBody>
-          <a:bodyPr/>
-          <a:lstStyle/>
-          <a:p>
-            <a:r>
-              <a:rPr lang="en-US" dirty="0"/>
-              <a:t>Game Section</a:t>
-            </a:r>
-            <a:endParaRPr lang="en-GB" dirty="0"/>
+        <p:spPr>
+          <a:xfrm>
+            <a:off x="838200" y="365125"/>
+            <a:ext cx="10515600" cy="1325563"/>
+          </a:xfrm>
+        </p:spPr>
+        <p:txBody>
+          <a:bodyPr/>
+          <a:lstStyle/>
+          <a:p>
+            <a:endParaRPr lang="en-GB"/>
           </a:p>
         </p:txBody>
       </p:sp>
@@ -5746,7 +6833,7 @@
           <p:cNvPr id="3" name="Tijdelijke aanduiding voor inhoud 2">
             <a:extLst>
               <a:ext uri="{FF2B5EF4-FFF2-40B4-BE49-F238E27FC236}">
-                <a16:creationId xmlns:a16="http://schemas.microsoft.com/office/drawing/2014/main" id="{83883B27-C7F6-410F-87EA-2B7BB495F001}"/>
+                <a16:creationId xmlns:a16="http://schemas.microsoft.com/office/drawing/2014/main" id="{2D5540EF-8E67-426E-9756-C31C09457EC8}"/>
               </a:ext>
             </a:extLst>
           </p:cNvPr>
@@ -5757,7 +6844,12 @@
             <p:ph idx="1"/>
           </p:nvPr>
         </p:nvSpPr>
-        <p:spPr/>
+        <p:spPr>
+          <a:xfrm>
+            <a:off x="838200" y="1825625"/>
+            <a:ext cx="10515600" cy="4351338"/>
+          </a:xfrm>
+        </p:spPr>
         <p:txBody>
           <a:bodyPr/>
           <a:lstStyle/>
@@ -5768,16 +6860,14 @@
       </p:sp>
       <p:pic>
         <p:nvPicPr>
-          <p:cNvPr id="4" name="Tijdelijke aanduiding voor inhoud 4">
-            <a:extLst>
-              <a:ext uri="{FF2B5EF4-FFF2-40B4-BE49-F238E27FC236}">
-                <a16:creationId xmlns:a16="http://schemas.microsoft.com/office/drawing/2014/main" id="{107E2329-7FB5-4DA0-9BB0-6E3E8B036856}"/>
-              </a:ext>
-            </a:extLst>
-          </p:cNvPr>
-          <p:cNvPicPr>
-            <a:picLocks noChangeAspect="1"/>
-          </p:cNvPicPr>
+          <p:cNvPr id="4" name="Afbeelding 3" descr="https://i.gyazo.com/92313d0deb4219850b64240bbf6ac563.png">
+            <a:extLst>
+              <a:ext uri="{FF2B5EF4-FFF2-40B4-BE49-F238E27FC236}">
+                <a16:creationId xmlns:a16="http://schemas.microsoft.com/office/drawing/2014/main" id="{A028D713-3C5C-43AE-8C26-EAF85AEBE869}"/>
+              </a:ext>
+            </a:extLst>
+          </p:cNvPr>
+          <p:cNvPicPr/>
           <p:nvPr/>
         </p:nvPicPr>
         <p:blipFill>
@@ -5788,24 +6878,68 @@
               </a:ext>
             </a:extLst>
           </a:blip>
+          <a:srcRect/>
           <a:stretch>
             <a:fillRect/>
           </a:stretch>
         </p:blipFill>
-        <p:spPr>
+        <p:spPr bwMode="auto">
           <a:xfrm>
-            <a:off x="4571997" y="2477291"/>
-            <a:ext cx="3048006" cy="3048006"/>
+            <a:off x="1069157" y="0"/>
+            <a:ext cx="10284643" cy="6865164"/>
           </a:xfrm>
           <a:prstGeom prst="rect">
             <a:avLst/>
           </a:prstGeom>
+          <a:noFill/>
+          <a:ln>
+            <a:noFill/>
+          </a:ln>
+        </p:spPr>
+      </p:pic>
+      <p:pic>
+        <p:nvPicPr>
+          <p:cNvPr id="5" name="Afbeelding 4" descr="https://i.gyazo.com/c9b1751b45ad2e4d89da43a4aca2559c.png">
+            <a:extLst>
+              <a:ext uri="{FF2B5EF4-FFF2-40B4-BE49-F238E27FC236}">
+                <a16:creationId xmlns:a16="http://schemas.microsoft.com/office/drawing/2014/main" id="{4B28D510-1C89-4827-8481-63A1C15A3939}"/>
+              </a:ext>
+            </a:extLst>
+          </p:cNvPr>
+          <p:cNvPicPr/>
+          <p:nvPr/>
+        </p:nvPicPr>
+        <p:blipFill>
+          <a:blip r:embed="rId4">
+            <a:extLst>
+              <a:ext uri="{28A0092B-C50C-407E-A947-70E740481C1C}">
+                <a14:useLocalDpi xmlns:a14="http://schemas.microsoft.com/office/drawing/2010/main" val="0"/>
+              </a:ext>
+            </a:extLst>
+          </a:blip>
+          <a:srcRect/>
+          <a:stretch>
+            <a:fillRect/>
+          </a:stretch>
+        </p:blipFill>
+        <p:spPr bwMode="auto">
+          <a:xfrm>
+            <a:off x="4892511" y="0"/>
+            <a:ext cx="7299489" cy="1581044"/>
+          </a:xfrm>
+          <a:prstGeom prst="rect">
+            <a:avLst/>
+          </a:prstGeom>
+          <a:noFill/>
+          <a:ln>
+            <a:noFill/>
+          </a:ln>
         </p:spPr>
       </p:pic>
     </p:spTree>
     <p:extLst>
       <p:ext uri="{BB962C8B-B14F-4D97-AF65-F5344CB8AC3E}">
-        <p14:creationId xmlns:p14="http://schemas.microsoft.com/office/powerpoint/2010/main" val="2570460330"/>
+        <p14:creationId xmlns:p14="http://schemas.microsoft.com/office/powerpoint/2010/main" val="3841030573"/>
       </p:ext>
     </p:extLst>
   </p:cSld>
@@ -5818,6 +6952,14 @@
 <file path=ppt/slides/slide6.xml><?xml version="1.0" encoding="utf-8"?>
 <p:sld xmlns:a="http://schemas.openxmlformats.org/drawingml/2006/main" xmlns:r="http://schemas.openxmlformats.org/officeDocument/2006/relationships" xmlns:p="http://schemas.openxmlformats.org/presentationml/2006/main">
   <p:cSld>
+    <p:bg>
+      <p:bgPr>
+        <a:solidFill>
+          <a:schemeClr val="tx1"/>
+        </a:solidFill>
+        <a:effectLst/>
+      </p:bgPr>
+    </p:bg>
     <p:spTree>
       <p:nvGrpSpPr>
         <p:cNvPr id="1" name=""/>
@@ -5837,7 +6979,7 @@
           <p:cNvPr id="2" name="Titel 1">
             <a:extLst>
               <a:ext uri="{FF2B5EF4-FFF2-40B4-BE49-F238E27FC236}">
-                <a16:creationId xmlns:a16="http://schemas.microsoft.com/office/drawing/2014/main" id="{2C3FD24F-DA43-429F-87BD-C94824342686}"/>
+                <a16:creationId xmlns:a16="http://schemas.microsoft.com/office/drawing/2014/main" id="{CC8E7A05-CA85-4965-AE1C-0E278AC92E1F}"/>
               </a:ext>
             </a:extLst>
           </p:cNvPr>
@@ -5853,19 +6995,7 @@
           <a:bodyPr/>
           <a:lstStyle/>
           <a:p>
-            <a:r>
-              <a:rPr lang="en-US" dirty="0"/>
-              <a:t>Mention about all the planning documents we have?(GDD/Asset lists/</a:t>
-            </a:r>
-            <a:r>
-              <a:rPr lang="en-US" dirty="0" err="1"/>
-              <a:t>trello</a:t>
-            </a:r>
-            <a:r>
-              <a:rPr lang="en-US" dirty="0"/>
-              <a:t>/git)</a:t>
-            </a:r>
-            <a:endParaRPr lang="en-GB" dirty="0"/>
+            <a:endParaRPr lang="en-GB"/>
           </a:p>
         </p:txBody>
       </p:sp>
@@ -5874,7 +7004,7 @@
           <p:cNvPr id="3" name="Tijdelijke aanduiding voor inhoud 2">
             <a:extLst>
               <a:ext uri="{FF2B5EF4-FFF2-40B4-BE49-F238E27FC236}">
-                <a16:creationId xmlns:a16="http://schemas.microsoft.com/office/drawing/2014/main" id="{71B985FD-54EB-415E-A191-02AB371F2FCD}"/>
+                <a16:creationId xmlns:a16="http://schemas.microsoft.com/office/drawing/2014/main" id="{B6E74B39-7628-4919-88C1-87DF93A69297}"/>
               </a:ext>
             </a:extLst>
           </p:cNvPr>
@@ -5890,72 +7020,53 @@
           <a:bodyPr/>
           <a:lstStyle/>
           <a:p>
-            <a:r>
-              <a:rPr lang="en-US" dirty="0"/>
-              <a:t>Make sure to explain </a:t>
-            </a:r>
-            <a:r>
-              <a:rPr lang="en-US" dirty="0" err="1"/>
-              <a:t>theyre</a:t>
-            </a:r>
-            <a:r>
-              <a:rPr lang="en-US" dirty="0"/>
-              <a:t> living breathing documents that will keep getting edited during the project they’d eat that shit up </a:t>
-            </a:r>
-            <a:r>
-              <a:rPr lang="en-US" dirty="0" err="1"/>
-              <a:t>ya</a:t>
-            </a:r>
-            <a:r>
-              <a:rPr lang="en-US" dirty="0"/>
-              <a:t> dig</a:t>
-            </a:r>
-          </a:p>
-          <a:p>
-            <a:r>
-              <a:rPr lang="en-US" dirty="0"/>
-              <a:t>Also a natural place to mention </a:t>
-            </a:r>
-            <a:r>
-              <a:rPr lang="en-US" dirty="0" err="1"/>
-              <a:t>trello</a:t>
-            </a:r>
-            <a:r>
-              <a:rPr lang="en-US" dirty="0"/>
-              <a:t>/</a:t>
-            </a:r>
-            <a:r>
-              <a:rPr lang="en-US" dirty="0" err="1"/>
-              <a:t>github</a:t>
-            </a:r>
-            <a:r>
-              <a:rPr lang="en-US" dirty="0"/>
-              <a:t>/</a:t>
-            </a:r>
-            <a:r>
-              <a:rPr lang="en-US" dirty="0" err="1"/>
-              <a:t>sourcetree</a:t>
-            </a:r>
-            <a:r>
-              <a:rPr lang="en-US" dirty="0"/>
-              <a:t>/discord/</a:t>
-            </a:r>
-            <a:r>
-              <a:rPr lang="en-US" dirty="0" err="1"/>
-              <a:t>whatsapp</a:t>
-            </a:r>
-            <a:r>
-              <a:rPr lang="en-GB" dirty="0"/>
-              <a:t> but at the start after the team section is also OK</a:t>
-            </a:r>
-            <a:endParaRPr lang="en-US" dirty="0"/>
-          </a:p>
-        </p:txBody>
-      </p:sp>
+            <a:endParaRPr lang="en-GB"/>
+          </a:p>
+        </p:txBody>
+      </p:sp>
+      <p:pic>
+        <p:nvPicPr>
+          <p:cNvPr id="4" name="Afbeelding 3" descr="https://i.gyazo.com/76952d8b2e4ad28e98fe13aff90f4ff9.png">
+            <a:extLst>
+              <a:ext uri="{FF2B5EF4-FFF2-40B4-BE49-F238E27FC236}">
+                <a16:creationId xmlns:a16="http://schemas.microsoft.com/office/drawing/2014/main" id="{A79CEE30-003C-4FD8-A2E7-427F6E49840F}"/>
+              </a:ext>
+            </a:extLst>
+          </p:cNvPr>
+          <p:cNvPicPr/>
+          <p:nvPr/>
+        </p:nvPicPr>
+        <p:blipFill>
+          <a:blip r:embed="rId3" cstate="print">
+            <a:extLst>
+              <a:ext uri="{28A0092B-C50C-407E-A947-70E740481C1C}">
+                <a14:useLocalDpi xmlns:a14="http://schemas.microsoft.com/office/drawing/2010/main" val="0"/>
+              </a:ext>
+            </a:extLst>
+          </a:blip>
+          <a:srcRect/>
+          <a:stretch>
+            <a:fillRect/>
+          </a:stretch>
+        </p:blipFill>
+        <p:spPr bwMode="auto">
+          <a:xfrm>
+            <a:off x="-1" y="1690688"/>
+            <a:ext cx="12192001" cy="3313426"/>
+          </a:xfrm>
+          <a:prstGeom prst="rect">
+            <a:avLst/>
+          </a:prstGeom>
+          <a:noFill/>
+          <a:ln>
+            <a:noFill/>
+          </a:ln>
+        </p:spPr>
+      </p:pic>
     </p:spTree>
     <p:extLst>
       <p:ext uri="{BB962C8B-B14F-4D97-AF65-F5344CB8AC3E}">
-        <p14:creationId xmlns:p14="http://schemas.microsoft.com/office/powerpoint/2010/main" val="3181745625"/>
+        <p14:creationId xmlns:p14="http://schemas.microsoft.com/office/powerpoint/2010/main" val="3449433620"/>
       </p:ext>
     </p:extLst>
   </p:cSld>
@@ -5968,6 +7079,14 @@
 <file path=ppt/slides/slide7.xml><?xml version="1.0" encoding="utf-8"?>
 <p:sld xmlns:a="http://schemas.openxmlformats.org/drawingml/2006/main" xmlns:r="http://schemas.openxmlformats.org/officeDocument/2006/relationships" xmlns:p="http://schemas.openxmlformats.org/presentationml/2006/main">
   <p:cSld>
+    <p:bg>
+      <p:bgPr>
+        <a:solidFill>
+          <a:schemeClr val="tx1"/>
+        </a:solidFill>
+        <a:effectLst/>
+      </p:bgPr>
+    </p:bg>
     <p:spTree>
       <p:nvGrpSpPr>
         <p:cNvPr id="1" name=""/>
@@ -5987,7 +7106,7 @@
           <p:cNvPr id="2" name="Titel 1">
             <a:extLst>
               <a:ext uri="{FF2B5EF4-FFF2-40B4-BE49-F238E27FC236}">
-                <a16:creationId xmlns:a16="http://schemas.microsoft.com/office/drawing/2014/main" id="{B5B8FA2B-9EF4-40A1-A428-BC9D3F014582}"/>
+                <a16:creationId xmlns:a16="http://schemas.microsoft.com/office/drawing/2014/main" id="{AF6812C6-FE15-4499-8915-92095972A182}"/>
               </a:ext>
             </a:extLst>
           </p:cNvPr>
@@ -6003,11 +7122,7 @@
           <a:bodyPr/>
           <a:lstStyle/>
           <a:p>
-            <a:r>
-              <a:rPr lang="en-US" dirty="0"/>
-              <a:t>UI Wireframe Section</a:t>
-            </a:r>
-            <a:endParaRPr lang="en-GB" dirty="0"/>
+            <a:endParaRPr lang="en-GB"/>
           </a:p>
         </p:txBody>
       </p:sp>
@@ -6016,7 +7131,7 @@
           <p:cNvPr id="3" name="Tijdelijke aanduiding voor inhoud 2">
             <a:extLst>
               <a:ext uri="{FF2B5EF4-FFF2-40B4-BE49-F238E27FC236}">
-                <a16:creationId xmlns:a16="http://schemas.microsoft.com/office/drawing/2014/main" id="{C05C7F3F-C983-40AF-A325-29E0EBB65074}"/>
+                <a16:creationId xmlns:a16="http://schemas.microsoft.com/office/drawing/2014/main" id="{54F0827A-12A4-46EA-9A86-FE68DB12F326}"/>
               </a:ext>
             </a:extLst>
           </p:cNvPr>
@@ -6036,10 +7151,38 @@
           </a:p>
         </p:txBody>
       </p:sp>
+      <p:pic>
+        <p:nvPicPr>
+          <p:cNvPr id="4" name="Afbeelding 3">
+            <a:extLst>
+              <a:ext uri="{FF2B5EF4-FFF2-40B4-BE49-F238E27FC236}">
+                <a16:creationId xmlns:a16="http://schemas.microsoft.com/office/drawing/2014/main" id="{FDBEAC3F-2C2B-48AD-826F-F3C74EB60BB2}"/>
+              </a:ext>
+            </a:extLst>
+          </p:cNvPr>
+          <p:cNvPicPr/>
+          <p:nvPr/>
+        </p:nvPicPr>
+        <p:blipFill>
+          <a:blip r:embed="rId3"/>
+          <a:stretch>
+            <a:fillRect/>
+          </a:stretch>
+        </p:blipFill>
+        <p:spPr>
+          <a:xfrm>
+            <a:off x="1724416" y="-8864"/>
+            <a:ext cx="8743167" cy="6866864"/>
+          </a:xfrm>
+          <a:prstGeom prst="rect">
+            <a:avLst/>
+          </a:prstGeom>
+        </p:spPr>
+      </p:pic>
     </p:spTree>
     <p:extLst>
       <p:ext uri="{BB962C8B-B14F-4D97-AF65-F5344CB8AC3E}">
-        <p14:creationId xmlns:p14="http://schemas.microsoft.com/office/powerpoint/2010/main" val="1663576427"/>
+        <p14:creationId xmlns:p14="http://schemas.microsoft.com/office/powerpoint/2010/main" val="3859589388"/>
       </p:ext>
     </p:extLst>
   </p:cSld>
@@ -6052,6 +7195,14 @@
 <file path=ppt/slides/slide8.xml><?xml version="1.0" encoding="utf-8"?>
 <p:sld xmlns:a="http://schemas.openxmlformats.org/drawingml/2006/main" xmlns:r="http://schemas.openxmlformats.org/officeDocument/2006/relationships" xmlns:p="http://schemas.openxmlformats.org/presentationml/2006/main">
   <p:cSld>
+    <p:bg>
+      <p:bgPr>
+        <a:solidFill>
+          <a:schemeClr val="tx1"/>
+        </a:solidFill>
+        <a:effectLst/>
+      </p:bgPr>
+    </p:bg>
     <p:spTree>
       <p:nvGrpSpPr>
         <p:cNvPr id="1" name=""/>
@@ -6071,7 +7222,7 @@
           <p:cNvPr id="2" name="Titel 1">
             <a:extLst>
               <a:ext uri="{FF2B5EF4-FFF2-40B4-BE49-F238E27FC236}">
-                <a16:creationId xmlns:a16="http://schemas.microsoft.com/office/drawing/2014/main" id="{03591E82-D8E9-48D8-AA2E-E00D34A77574}"/>
+                <a16:creationId xmlns:a16="http://schemas.microsoft.com/office/drawing/2014/main" id="{AF6812C6-FE15-4499-8915-92095972A182}"/>
               </a:ext>
             </a:extLst>
           </p:cNvPr>
@@ -6087,15 +7238,7 @@
           <a:bodyPr/>
           <a:lstStyle/>
           <a:p>
-            <a:r>
-              <a:rPr lang="en-US" dirty="0" err="1"/>
-              <a:t>Moodboard</a:t>
-            </a:r>
-            <a:r>
-              <a:rPr lang="en-US" dirty="0"/>
-              <a:t> Section</a:t>
-            </a:r>
-            <a:endParaRPr lang="en-GB" dirty="0"/>
+            <a:endParaRPr lang="en-GB"/>
           </a:p>
         </p:txBody>
       </p:sp>
@@ -6104,7 +7247,7 @@
           <p:cNvPr id="3" name="Tijdelijke aanduiding voor inhoud 2">
             <a:extLst>
               <a:ext uri="{FF2B5EF4-FFF2-40B4-BE49-F238E27FC236}">
-                <a16:creationId xmlns:a16="http://schemas.microsoft.com/office/drawing/2014/main" id="{1EF16F8F-EDDD-47C2-BF01-A484955D2BB7}"/>
+                <a16:creationId xmlns:a16="http://schemas.microsoft.com/office/drawing/2014/main" id="{54F0827A-12A4-46EA-9A86-FE68DB12F326}"/>
               </a:ext>
             </a:extLst>
           </p:cNvPr>
@@ -6124,10 +7267,38 @@
           </a:p>
         </p:txBody>
       </p:sp>
+      <p:pic>
+        <p:nvPicPr>
+          <p:cNvPr id="5" name="Afbeelding 4">
+            <a:extLst>
+              <a:ext uri="{FF2B5EF4-FFF2-40B4-BE49-F238E27FC236}">
+                <a16:creationId xmlns:a16="http://schemas.microsoft.com/office/drawing/2014/main" id="{F8CF2B8D-D039-4553-B207-8B1E1D474EF5}"/>
+              </a:ext>
+            </a:extLst>
+          </p:cNvPr>
+          <p:cNvPicPr/>
+          <p:nvPr/>
+        </p:nvPicPr>
+        <p:blipFill>
+          <a:blip r:embed="rId3"/>
+          <a:stretch>
+            <a:fillRect/>
+          </a:stretch>
+        </p:blipFill>
+        <p:spPr>
+          <a:xfrm>
+            <a:off x="-42750" y="2190750"/>
+            <a:ext cx="12234750" cy="2476500"/>
+          </a:xfrm>
+          <a:prstGeom prst="rect">
+            <a:avLst/>
+          </a:prstGeom>
+        </p:spPr>
+      </p:pic>
     </p:spTree>
     <p:extLst>
       <p:ext uri="{BB962C8B-B14F-4D97-AF65-F5344CB8AC3E}">
-        <p14:creationId xmlns:p14="http://schemas.microsoft.com/office/powerpoint/2010/main" val="576153207"/>
+        <p14:creationId xmlns:p14="http://schemas.microsoft.com/office/powerpoint/2010/main" val="3623165616"/>
       </p:ext>
     </p:extLst>
   </p:cSld>
@@ -6159,7 +7330,7 @@
           <p:cNvPr id="2" name="Titel 1">
             <a:extLst>
               <a:ext uri="{FF2B5EF4-FFF2-40B4-BE49-F238E27FC236}">
-                <a16:creationId xmlns:a16="http://schemas.microsoft.com/office/drawing/2014/main" id="{7A7D6EC4-674B-4668-BEA3-F4BFB0C211BE}"/>
+                <a16:creationId xmlns:a16="http://schemas.microsoft.com/office/drawing/2014/main" id="{ABFC3A42-D7C3-4A82-8955-E949E4508BF0}"/>
               </a:ext>
             </a:extLst>
           </p:cNvPr>
@@ -6176,42 +7347,259 @@
           <a:lstStyle/>
           <a:p>
             <a:r>
-              <a:rPr lang="en-US" dirty="0"/>
-              <a:t>Stylesheet Section</a:t>
-            </a:r>
-            <a:endParaRPr lang="en-GB" dirty="0"/>
-          </a:p>
-        </p:txBody>
-      </p:sp>
-      <p:sp>
-        <p:nvSpPr>
-          <p:cNvPr id="3" name="Tijdelijke aanduiding voor inhoud 2">
-            <a:extLst>
-              <a:ext uri="{FF2B5EF4-FFF2-40B4-BE49-F238E27FC236}">
-                <a16:creationId xmlns:a16="http://schemas.microsoft.com/office/drawing/2014/main" id="{05E1BF49-8E88-4D6D-987E-CCBC52B45BD6}"/>
-              </a:ext>
-            </a:extLst>
-          </p:cNvPr>
-          <p:cNvSpPr>
-            <a:spLocks noGrp="1"/>
-          </p:cNvSpPr>
-          <p:nvPr>
-            <p:ph idx="1"/>
-          </p:nvPr>
-        </p:nvSpPr>
-        <p:spPr/>
-        <p:txBody>
-          <a:bodyPr/>
-          <a:lstStyle/>
-          <a:p>
-            <a:endParaRPr lang="en-GB"/>
-          </a:p>
-        </p:txBody>
-      </p:sp>
+              <a:rPr lang="en-US" dirty="0">
+                <a:latin typeface="Tenor sans" panose="02000000000000000000" pitchFamily="2" charset="0"/>
+              </a:rPr>
+              <a:t>The Game</a:t>
+            </a:r>
+            <a:endParaRPr lang="en-GB" dirty="0">
+              <a:latin typeface="Tenor sans" panose="02000000000000000000" pitchFamily="2" charset="0"/>
+            </a:endParaRPr>
+          </a:p>
+        </p:txBody>
+      </p:sp>
+      <p:pic>
+        <p:nvPicPr>
+          <p:cNvPr id="4" name="Tijdelijke aanduiding voor inhoud 4">
+            <a:extLst>
+              <a:ext uri="{FF2B5EF4-FFF2-40B4-BE49-F238E27FC236}">
+                <a16:creationId xmlns:a16="http://schemas.microsoft.com/office/drawing/2014/main" id="{107E2329-7FB5-4DA0-9BB0-6E3E8B036856}"/>
+              </a:ext>
+            </a:extLst>
+          </p:cNvPr>
+          <p:cNvPicPr>
+            <a:picLocks noChangeAspect="1"/>
+          </p:cNvPicPr>
+          <p:nvPr/>
+        </p:nvPicPr>
+        <p:blipFill>
+          <a:blip r:embed="rId4">
+            <a:extLst>
+              <a:ext uri="{28A0092B-C50C-407E-A947-70E740481C1C}">
+                <a14:useLocalDpi xmlns:a14="http://schemas.microsoft.com/office/drawing/2010/main" val="0"/>
+              </a:ext>
+            </a:extLst>
+          </a:blip>
+          <a:stretch>
+            <a:fillRect/>
+          </a:stretch>
+        </p:blipFill>
+        <p:spPr>
+          <a:xfrm>
+            <a:off x="8908723" y="-159424"/>
+            <a:ext cx="3048006" cy="3048006"/>
+          </a:xfrm>
+          <a:prstGeom prst="rect">
+            <a:avLst/>
+          </a:prstGeom>
+        </p:spPr>
+      </p:pic>
+      <p:sp>
+        <p:nvSpPr>
+          <p:cNvPr id="5" name="Rectangle 2">
+            <a:extLst>
+              <a:ext uri="{FF2B5EF4-FFF2-40B4-BE49-F238E27FC236}">
+                <a16:creationId xmlns:a16="http://schemas.microsoft.com/office/drawing/2014/main" id="{8A8DB61B-FEC5-40A9-A90F-57A66833E623}"/>
+              </a:ext>
+            </a:extLst>
+          </p:cNvPr>
+          <p:cNvSpPr>
+            <a:spLocks noChangeArrowheads="1"/>
+          </p:cNvSpPr>
+          <p:nvPr/>
+        </p:nvSpPr>
+        <p:spPr bwMode="auto">
+          <a:xfrm>
+            <a:off x="9128125" y="1825625"/>
+            <a:ext cx="12192000" cy="0"/>
+          </a:xfrm>
+          <a:prstGeom prst="rect">
+            <a:avLst/>
+          </a:prstGeom>
+          <a:noFill/>
+          <a:ln>
+            <a:noFill/>
+          </a:ln>
+          <a:effectLst/>
+          <a:extLst>
+            <a:ext uri="{909E8E84-426E-40DD-AFC4-6F175D3DCCD1}">
+              <a14:hiddenFill xmlns:a14="http://schemas.microsoft.com/office/drawing/2010/main">
+                <a:solidFill>
+                  <a:schemeClr val="accent1"/>
+                </a:solidFill>
+              </a14:hiddenFill>
+            </a:ext>
+            <a:ext uri="{91240B29-F687-4F45-9708-019B960494DF}">
+              <a14:hiddenLine xmlns:a14="http://schemas.microsoft.com/office/drawing/2010/main" w="9525">
+                <a:solidFill>
+                  <a:schemeClr val="tx1"/>
+                </a:solidFill>
+                <a:miter lim="800000"/>
+                <a:headEnd/>
+                <a:tailEnd/>
+              </a14:hiddenLine>
+            </a:ext>
+            <a:ext uri="{AF507438-7753-43E0-B8FC-AC1667EBCBE1}">
+              <a14:hiddenEffects xmlns:a14="http://schemas.microsoft.com/office/drawing/2010/main">
+                <a:effectLst>
+                  <a:outerShdw dist="35921" dir="2700000" algn="ctr" rotWithShape="0">
+                    <a:schemeClr val="bg2"/>
+                  </a:outerShdw>
+                </a:effectLst>
+              </a14:hiddenEffects>
+            </a:ext>
+          </a:extLst>
+        </p:spPr>
+        <p:txBody>
+          <a:bodyPr vert="horz" wrap="none" lIns="91440" tIns="45720" rIns="91440" bIns="45720" numCol="1" anchor="ctr" anchorCtr="0" compatLnSpc="1">
+            <a:prstTxWarp prst="textNoShape">
+              <a:avLst/>
+            </a:prstTxWarp>
+            <a:spAutoFit/>
+          </a:bodyPr>
+          <a:lstStyle/>
+          <a:p>
+            <a:endParaRPr lang="en-GB"/>
+          </a:p>
+        </p:txBody>
+      </p:sp>
+      <p:graphicFrame>
+        <p:nvGraphicFramePr>
+          <p:cNvPr id="6" name="Object 5">
+            <a:extLst>
+              <a:ext uri="{FF2B5EF4-FFF2-40B4-BE49-F238E27FC236}">
+                <a16:creationId xmlns:a16="http://schemas.microsoft.com/office/drawing/2014/main" id="{17879AF5-F47A-4F3D-800C-BCF717A3F81C}"/>
+              </a:ext>
+            </a:extLst>
+          </p:cNvPr>
+          <p:cNvGraphicFramePr>
+            <a:graphicFrameLocks noChangeAspect="1"/>
+          </p:cNvGraphicFramePr>
+          <p:nvPr>
+            <p:extLst>
+              <p:ext uri="{D42A27DB-BD31-4B8C-83A1-F6EECF244321}">
+                <p14:modId xmlns:p14="http://schemas.microsoft.com/office/powerpoint/2010/main" val="2048677385"/>
+              </p:ext>
+            </p:extLst>
+          </p:nvPr>
+        </p:nvGraphicFramePr>
+        <p:xfrm>
+          <a:off x="7028179" y="2591705"/>
+          <a:ext cx="2101234" cy="3899723"/>
+        </p:xfrm>
+        <a:graphic>
+          <a:graphicData uri="http://schemas.openxmlformats.org/presentationml/2006/ole">
+            <mc:AlternateContent xmlns:mc="http://schemas.openxmlformats.org/markup-compatibility/2006">
+              <mc:Choice xmlns:v="urn:schemas-microsoft-com:vml" Requires="v">
+                <p:oleObj spid="_x0000_s1031" r:id="rId5" imgW="15123751" imgH="28014576" progId="Unknown">
+                  <p:embed/>
+                </p:oleObj>
+              </mc:Choice>
+              <mc:Fallback>
+                <p:oleObj r:id="rId5" imgW="15123751" imgH="28014576" progId="Unknown">
+                  <p:embed/>
+                  <p:pic>
+                    <p:nvPicPr>
+                      <p:cNvPr id="0" name="Object 1"/>
+                      <p:cNvPicPr>
+                        <a:picLocks noChangeAspect="1" noChangeArrowheads="1"/>
+                      </p:cNvPicPr>
+                      <p:nvPr/>
+                    </p:nvPicPr>
+                    <p:blipFill>
+                      <a:blip r:embed="rId6">
+                        <a:extLst>
+                          <a:ext uri="{28A0092B-C50C-407E-A947-70E740481C1C}">
+                            <a14:useLocalDpi xmlns:a14="http://schemas.microsoft.com/office/drawing/2010/main" val="0"/>
+                          </a:ext>
+                        </a:extLst>
+                      </a:blip>
+                      <a:srcRect/>
+                      <a:stretch>
+                        <a:fillRect/>
+                      </a:stretch>
+                    </p:blipFill>
+                    <p:spPr bwMode="auto">
+                      <a:xfrm>
+                        <a:off x="7028179" y="2591705"/>
+                        <a:ext cx="2101234" cy="3899723"/>
+                      </a:xfrm>
+                      <a:prstGeom prst="rect">
+                        <a:avLst/>
+                      </a:prstGeom>
+                      <a:noFill/>
+                    </p:spPr>
+                  </p:pic>
+                </p:oleObj>
+              </mc:Fallback>
+            </mc:AlternateContent>
+          </a:graphicData>
+        </a:graphic>
+      </p:graphicFrame>
+      <p:pic>
+        <p:nvPicPr>
+          <p:cNvPr id="7" name="Afbeelding 6">
+            <a:extLst>
+              <a:ext uri="{FF2B5EF4-FFF2-40B4-BE49-F238E27FC236}">
+                <a16:creationId xmlns:a16="http://schemas.microsoft.com/office/drawing/2014/main" id="{8C4F6A4C-717C-4ACB-BFE0-277B590B4367}"/>
+              </a:ext>
+            </a:extLst>
+          </p:cNvPr>
+          <p:cNvPicPr>
+            <a:picLocks noChangeAspect="1"/>
+          </p:cNvPicPr>
+          <p:nvPr/>
+        </p:nvPicPr>
+        <p:blipFill>
+          <a:blip r:embed="rId7"/>
+          <a:stretch>
+            <a:fillRect/>
+          </a:stretch>
+        </p:blipFill>
+        <p:spPr>
+          <a:xfrm>
+            <a:off x="4879473" y="2592307"/>
+            <a:ext cx="2148707" cy="3899967"/>
+          </a:xfrm>
+          <a:prstGeom prst="rect">
+            <a:avLst/>
+          </a:prstGeom>
+        </p:spPr>
+      </p:pic>
+      <p:pic>
+        <p:nvPicPr>
+          <p:cNvPr id="8" name="Afbeelding 7">
+            <a:extLst>
+              <a:ext uri="{FF2B5EF4-FFF2-40B4-BE49-F238E27FC236}">
+                <a16:creationId xmlns:a16="http://schemas.microsoft.com/office/drawing/2014/main" id="{7521FF66-8F8B-41FC-BB04-FF18081806A6}"/>
+              </a:ext>
+            </a:extLst>
+          </p:cNvPr>
+          <p:cNvPicPr>
+            <a:picLocks noChangeAspect="1"/>
+          </p:cNvPicPr>
+          <p:nvPr/>
+        </p:nvPicPr>
+        <p:blipFill>
+          <a:blip r:embed="rId8"/>
+          <a:stretch>
+            <a:fillRect/>
+          </a:stretch>
+        </p:blipFill>
+        <p:spPr>
+          <a:xfrm>
+            <a:off x="365956" y="2593147"/>
+            <a:ext cx="4513517" cy="3899728"/>
+          </a:xfrm>
+          <a:prstGeom prst="rect">
+            <a:avLst/>
+          </a:prstGeom>
+        </p:spPr>
+      </p:pic>
     </p:spTree>
     <p:extLst>
       <p:ext uri="{BB962C8B-B14F-4D97-AF65-F5344CB8AC3E}">
-        <p14:creationId xmlns:p14="http://schemas.microsoft.com/office/powerpoint/2010/main" val="2242478784"/>
+        <p14:creationId xmlns:p14="http://schemas.microsoft.com/office/powerpoint/2010/main" val="2570460330"/>
       </p:ext>
     </p:extLst>
   </p:cSld>

</xml_diff>